<commit_message>
Add json logs slide.  Tried to remove all extraneous notes from slides.
</commit_message>
<xml_diff>
--- a/oclc-elk.pptx
+++ b/oclc-elk.pptx
@@ -5,7 +5,7 @@
     <p:sldMasterId id="2147483648" r:id="rId1"/>
   </p:sldMasterIdLst>
   <p:notesMasterIdLst>
-    <p:notesMasterId r:id="rId32"/>
+    <p:notesMasterId r:id="rId33"/>
   </p:notesMasterIdLst>
   <p:sldIdLst>
     <p:sldId id="256" r:id="rId2"/>
@@ -31,13 +31,14 @@
     <p:sldId id="292" r:id="rId22"/>
     <p:sldId id="295" r:id="rId23"/>
     <p:sldId id="296" r:id="rId24"/>
-    <p:sldId id="279" r:id="rId25"/>
-    <p:sldId id="283" r:id="rId26"/>
-    <p:sldId id="285" r:id="rId27"/>
-    <p:sldId id="286" r:id="rId28"/>
-    <p:sldId id="284" r:id="rId29"/>
-    <p:sldId id="288" r:id="rId30"/>
-    <p:sldId id="287" r:id="rId31"/>
+    <p:sldId id="298" r:id="rId25"/>
+    <p:sldId id="279" r:id="rId26"/>
+    <p:sldId id="283" r:id="rId27"/>
+    <p:sldId id="285" r:id="rId28"/>
+    <p:sldId id="286" r:id="rId29"/>
+    <p:sldId id="284" r:id="rId30"/>
+    <p:sldId id="288" r:id="rId31"/>
+    <p:sldId id="287" r:id="rId32"/>
   </p:sldIdLst>
   <p:sldSz cx="9144000" cy="6858000" type="screen4x3"/>
   <p:notesSz cx="6858000" cy="9144000"/>
@@ -671,7 +672,7 @@
           <a:p>
             <a:r>
               <a:rPr lang="en-US" baseline="0" dirty="0" smtClean="0"/>
-              <a:t>Is this familiar to anyone else?</a:t>
+              <a:t>Is this familiar to anyone else?  You can make a career being good at this…</a:t>
             </a:r>
             <a:endParaRPr lang="en-US" dirty="0"/>
           </a:p>
@@ -867,38 +868,6 @@
           <a:bodyPr/>
           <a:lstStyle/>
           <a:p>
-            <a:r>
-              <a:rPr lang="en-US" dirty="0" smtClean="0"/>
-              <a:t>With ELK – </a:t>
-            </a:r>
-          </a:p>
-          <a:p>
-            <a:endParaRPr lang="en-US" dirty="0" smtClean="0"/>
-          </a:p>
-          <a:p>
-            <a:pPr marL="0" marR="0" indent="0" algn="l" defTabSz="457200" rtl="0" eaLnBrk="1" fontAlgn="auto" latinLnBrk="0" hangingPunct="1">
-              <a:lnSpc>
-                <a:spcPct val="100000"/>
-              </a:lnSpc>
-              <a:spcBef>
-                <a:spcPts val="0"/>
-              </a:spcBef>
-              <a:spcAft>
-                <a:spcPts val="0"/>
-              </a:spcAft>
-              <a:buClrTx/>
-              <a:buSzTx/>
-              <a:buFontTx/>
-              <a:buNone/>
-              <a:tabLst/>
-              <a:defRPr/>
-            </a:pPr>
-            <a:r>
-              <a:rPr lang="en-US" baseline="0" dirty="0" smtClean="0"/>
-              <a:t>15-20 minutes to assemble all logs you wanted to use to debug a problem -&gt; instantaneous to hone in on the exact problem.</a:t>
-            </a:r>
-          </a:p>
-          <a:p>
             <a:endParaRPr lang="en-US" dirty="0"/>
           </a:p>
         </p:txBody>
@@ -1229,15 +1198,7 @@
             </a:r>
             <a:r>
               <a:rPr lang="en-US" sz="1200" dirty="0" smtClean="0"/>
-              <a:t> is a project similar to Apache Flume if you are </a:t>
-            </a:r>
-            <a:r>
-              <a:rPr lang="en-US" sz="1200" dirty="0" err="1" smtClean="0"/>
-              <a:t>famailiar</a:t>
-            </a:r>
-            <a:r>
-              <a:rPr lang="en-US" sz="1200" dirty="0" smtClean="0"/>
-              <a:t> with that project.</a:t>
+              <a:t> takes logs and other event data from your systems and move them into a central place.</a:t>
             </a:r>
           </a:p>
           <a:p>
@@ -1258,13 +1219,65 @@
               <a:tabLst/>
               <a:defRPr/>
             </a:pPr>
+            <a:endParaRPr lang="en-US" sz="1200" dirty="0" smtClean="0"/>
+          </a:p>
+          <a:p>
+            <a:pPr marL="0" marR="0" indent="0" algn="l" defTabSz="457200" rtl="0" eaLnBrk="1" fontAlgn="auto" latinLnBrk="0" hangingPunct="1">
+              <a:lnSpc>
+                <a:spcPct val="100000"/>
+              </a:lnSpc>
+              <a:spcBef>
+                <a:spcPts val="0"/>
+              </a:spcBef>
+              <a:spcAft>
+                <a:spcPts val="0"/>
+              </a:spcAft>
+              <a:buClrTx/>
+              <a:buSzTx/>
+              <a:buFontTx/>
+              <a:buNone/>
+              <a:tabLst/>
+              <a:defRPr/>
+            </a:pPr>
+            <a:endParaRPr lang="en-US" sz="1200" dirty="0" smtClean="0"/>
+          </a:p>
+          <a:p>
+            <a:pPr marL="0" marR="0" indent="0" algn="l" defTabSz="457200" rtl="0" eaLnBrk="1" fontAlgn="auto" latinLnBrk="0" hangingPunct="1">
+              <a:lnSpc>
+                <a:spcPct val="100000"/>
+              </a:lnSpc>
+              <a:spcBef>
+                <a:spcPts val="0"/>
+              </a:spcBef>
+              <a:spcAft>
+                <a:spcPts val="0"/>
+              </a:spcAft>
+              <a:buClrTx/>
+              <a:buSzTx/>
+              <a:buFontTx/>
+              <a:buNone/>
+              <a:tabLst/>
+              <a:defRPr/>
+            </a:pPr>
             <a:r>
               <a:rPr lang="en-US" sz="1200" dirty="0" err="1" smtClean="0"/>
               <a:t>Logstash</a:t>
             </a:r>
             <a:r>
               <a:rPr lang="en-US" sz="1200" dirty="0" smtClean="0"/>
-              <a:t> takes logs and other event data from your systems and move them into a central place.</a:t>
+              <a:t> </a:t>
+            </a:r>
+            <a:r>
+              <a:rPr lang="en-US" sz="1200" dirty="0" smtClean="0"/>
+              <a:t>is a project similar to Apache Flume if you are </a:t>
+            </a:r>
+            <a:r>
+              <a:rPr lang="en-US" sz="1200" dirty="0" err="1" smtClean="0"/>
+              <a:t>famailiar</a:t>
+            </a:r>
+            <a:r>
+              <a:rPr lang="en-US" sz="1200" dirty="0" smtClean="0"/>
+              <a:t> with that project.</a:t>
             </a:r>
           </a:p>
           <a:p>
@@ -1465,8 +1478,13 @@
             </a:pPr>
             <a:r>
               <a:rPr lang="en-US" sz="1200" baseline="0" dirty="0" smtClean="0"/>
-              <a:t>Or unstructured data can be treated the same as structured.</a:t>
-            </a:r>
+              <a:t>Or unstructured data can be treated the same as structured</a:t>
+            </a:r>
+            <a:r>
+              <a:rPr lang="en-US" sz="1200" baseline="0" dirty="0" smtClean="0"/>
+              <a:t>.</a:t>
+            </a:r>
+            <a:endParaRPr lang="en-US" sz="1200" baseline="0" dirty="0" smtClean="0"/>
           </a:p>
           <a:p>
             <a:pPr marL="0" marR="0" indent="0" algn="l" defTabSz="457200" rtl="0" eaLnBrk="1" fontAlgn="auto" latinLnBrk="0" hangingPunct="1">
@@ -1617,7 +1635,11 @@
             </a:r>
             <a:r>
               <a:rPr lang="en-US" sz="1200" baseline="0" dirty="0" smtClean="0"/>
-              <a:t> – entire java ecosystem available to you.</a:t>
+              <a:t> – entire java ecosystem available to you</a:t>
+            </a:r>
+            <a:r>
+              <a:rPr lang="en-US" sz="1200" baseline="0" dirty="0" smtClean="0"/>
+              <a:t>.  Most of ruby ecosystem is available to you.</a:t>
             </a:r>
             <a:endParaRPr lang="en-US" sz="1200" dirty="0" smtClean="0"/>
           </a:p>
@@ -1729,7 +1751,7 @@
             </a:r>
             <a:r>
               <a:rPr lang="en-US" sz="1200" baseline="0" dirty="0" smtClean="0"/>
-              <a:t> UI to zoom in and out of what we were looking for.  But still no magic.</a:t>
+              <a:t> UI to zoom in and out of what we were looking for</a:t>
             </a:r>
             <a:endParaRPr lang="en-US" sz="1200" dirty="0" smtClean="0"/>
           </a:p>
@@ -2124,6 +2146,38 @@
               <a:rPr lang="en-US" baseline="0" dirty="0" smtClean="0"/>
               <a:t> is we were shooting for: Magic!</a:t>
             </a:r>
+          </a:p>
+          <a:p>
+            <a:endParaRPr lang="en-US" baseline="0" dirty="0" smtClean="0"/>
+          </a:p>
+          <a:p>
+            <a:pPr marL="0" marR="0" indent="0" algn="l" defTabSz="457200" rtl="0" eaLnBrk="1" fontAlgn="auto" latinLnBrk="0" hangingPunct="1">
+              <a:lnSpc>
+                <a:spcPct val="100000"/>
+              </a:lnSpc>
+              <a:spcBef>
+                <a:spcPts val="0"/>
+              </a:spcBef>
+              <a:spcAft>
+                <a:spcPts val="0"/>
+              </a:spcAft>
+              <a:buClrTx/>
+              <a:buSzTx/>
+              <a:buFontTx/>
+              <a:buNone/>
+              <a:tabLst/>
+              <a:defRPr/>
+            </a:pPr>
+            <a:r>
+              <a:rPr lang="en-US" baseline="0" dirty="0" smtClean="0"/>
+              <a:t>All of this infrastructure, and </a:t>
+            </a:r>
+            <a:r>
+              <a:rPr lang="en-US" dirty="0" smtClean="0"/>
+              <a:t>still no magic (yet)</a:t>
+            </a:r>
+          </a:p>
+          <a:p>
             <a:endParaRPr lang="en-US" dirty="0"/>
           </a:p>
         </p:txBody>
@@ -2309,6 +2363,19 @@
               <a:rPr lang="en-US" dirty="0" smtClean="0"/>
               <a:t>"Mapped Diagnostic Context" is essentially a map maintained by the logging framework where the application code provides key-value pairs which can then be inserted by the logging framework in log messages.</a:t>
             </a:r>
+          </a:p>
+          <a:p>
+            <a:endParaRPr lang="en-US" dirty="0" smtClean="0"/>
+          </a:p>
+          <a:p>
+            <a:r>
+              <a:rPr lang="en-US" dirty="0" smtClean="0"/>
+              <a:t>Stick an</a:t>
+            </a:r>
+            <a:r>
+              <a:rPr lang="en-US" baseline="0" dirty="0" smtClean="0"/>
+              <a:t> identifier in the MDC – it ends up on every appropriate log event.</a:t>
+            </a:r>
             <a:endParaRPr lang="en-US" dirty="0"/>
           </a:p>
         </p:txBody>
@@ -2414,6 +2481,23 @@
               <a:rPr lang="en-US" baseline="0" dirty="0" smtClean="0"/>
               <a:t> selected field.  (Multiples allowed)</a:t>
             </a:r>
+          </a:p>
+          <a:p>
+            <a:endParaRPr lang="en-US" baseline="0" dirty="0" smtClean="0"/>
+          </a:p>
+          <a:p>
+            <a:r>
+              <a:rPr lang="en-US" baseline="0" dirty="0" smtClean="0"/>
+              <a:t>We map these markers to </a:t>
+            </a:r>
+            <a:r>
+              <a:rPr lang="en-US" baseline="0" dirty="0" err="1" smtClean="0"/>
+              <a:t>logstash</a:t>
+            </a:r>
+            <a:r>
+              <a:rPr lang="en-US" baseline="0" dirty="0" smtClean="0"/>
+              <a:t> Tags.</a:t>
+            </a:r>
             <a:endParaRPr lang="en-US" dirty="0"/>
           </a:p>
         </p:txBody>
@@ -2500,19 +2584,44 @@
           <a:p>
             <a:r>
               <a:rPr lang="en-US" dirty="0" smtClean="0"/>
-              <a:t>Show</a:t>
+              <a:t>It was easier for us to output </a:t>
+            </a:r>
+            <a:r>
+              <a:rPr lang="en-US" dirty="0" err="1" smtClean="0"/>
+              <a:t>json</a:t>
             </a:r>
             <a:r>
               <a:rPr lang="en-US" baseline="0" dirty="0" smtClean="0"/>
-              <a:t> </a:t>
+              <a:t> logs to ease the burden on </a:t>
             </a:r>
             <a:r>
               <a:rPr lang="en-US" baseline="0" dirty="0" err="1" smtClean="0"/>
-              <a:t>kibana</a:t>
+              <a:t>logstash</a:t>
             </a:r>
             <a:r>
               <a:rPr lang="en-US" baseline="0" dirty="0" smtClean="0"/>
-              <a:t> sharing of temporary dashboard</a:t>
+              <a:t> – easier to write an encoder than regex parsing in </a:t>
+            </a:r>
+            <a:r>
+              <a:rPr lang="en-US" baseline="0" dirty="0" err="1" smtClean="0"/>
+              <a:t>logstash</a:t>
+            </a:r>
+            <a:r>
+              <a:rPr lang="en-US" baseline="0" dirty="0" smtClean="0"/>
+              <a:t>.</a:t>
+            </a:r>
+          </a:p>
+          <a:p>
+            <a:endParaRPr lang="en-US" baseline="0" dirty="0" smtClean="0"/>
+          </a:p>
+          <a:p>
+            <a:r>
+              <a:rPr lang="en-US" baseline="0" dirty="0" err="1" smtClean="0"/>
+              <a:t>Logstash</a:t>
+            </a:r>
+            <a:r>
+              <a:rPr lang="en-US" baseline="0" dirty="0" smtClean="0"/>
+              <a:t> could handle the raw logs, but why?</a:t>
             </a:r>
             <a:endParaRPr lang="en-US" dirty="0"/>
           </a:p>
@@ -2544,7 +2653,7 @@
     </p:spTree>
     <p:extLst>
       <p:ext uri="{BB962C8B-B14F-4D97-AF65-F5344CB8AC3E}">
-        <p14:creationId xmlns:p14="http://schemas.microsoft.com/office/powerpoint/2010/main" val="112529183"/>
+        <p14:creationId xmlns:p14="http://schemas.microsoft.com/office/powerpoint/2010/main" val="1460070717"/>
       </p:ext>
     </p:extLst>
   </p:cSld>
@@ -2598,22 +2707,6 @@
           <a:bodyPr/>
           <a:lstStyle/>
           <a:p>
-            <a:r>
-              <a:rPr lang="en-US" dirty="0" smtClean="0"/>
-              <a:t>Spring boot</a:t>
-            </a:r>
-          </a:p>
-          <a:p>
-            <a:r>
-              <a:rPr lang="en-US" dirty="0" smtClean="0"/>
-              <a:t>Spring boot actuator health checks</a:t>
-            </a:r>
-          </a:p>
-          <a:p>
-            <a:r>
-              <a:rPr lang="en-US" dirty="0" smtClean="0"/>
-              <a:t>Gatling Load test tool</a:t>
-            </a:r>
             <a:endParaRPr lang="en-US" dirty="0"/>
           </a:p>
         </p:txBody>
@@ -2644,7 +2737,7 @@
     </p:spTree>
     <p:extLst>
       <p:ext uri="{BB962C8B-B14F-4D97-AF65-F5344CB8AC3E}">
-        <p14:creationId xmlns:p14="http://schemas.microsoft.com/office/powerpoint/2010/main" val="284077081"/>
+        <p14:creationId xmlns:p14="http://schemas.microsoft.com/office/powerpoint/2010/main" val="112529183"/>
       </p:ext>
     </p:extLst>
   </p:cSld>
@@ -2699,206 +2792,21 @@
           <a:lstStyle/>
           <a:p>
             <a:r>
-              <a:rPr lang="en-US" baseline="0" dirty="0" smtClean="0"/>
-              <a:t>When starting demo describe </a:t>
-            </a:r>
-            <a:r>
-              <a:rPr lang="en-US" baseline="0" dirty="0" err="1" smtClean="0"/>
-              <a:t>logstash</a:t>
-            </a:r>
-            <a:r>
-              <a:rPr lang="en-US" baseline="0" dirty="0" smtClean="0"/>
-              <a:t> and </a:t>
-            </a:r>
-            <a:r>
-              <a:rPr lang="en-US" baseline="0" dirty="0" err="1" smtClean="0"/>
-              <a:t>elasticsearch</a:t>
-            </a:r>
-            <a:r>
-              <a:rPr lang="en-US" baseline="0" dirty="0" smtClean="0"/>
-              <a:t> are running locally (with command line) and then show </a:t>
-            </a:r>
-            <a:r>
-              <a:rPr lang="en-US" baseline="0" dirty="0" err="1" smtClean="0"/>
-              <a:t>logstash</a:t>
-            </a:r>
-            <a:r>
-              <a:rPr lang="en-US" baseline="0" dirty="0" smtClean="0"/>
-              <a:t> </a:t>
-            </a:r>
-            <a:r>
-              <a:rPr lang="en-US" baseline="0" dirty="0" err="1" smtClean="0"/>
-              <a:t>config</a:t>
-            </a:r>
-            <a:r>
-              <a:rPr lang="en-US" baseline="0" dirty="0" smtClean="0"/>
-              <a:t> input and output before moving into </a:t>
-            </a:r>
-            <a:r>
-              <a:rPr lang="en-US" baseline="0" dirty="0" err="1" smtClean="0"/>
-              <a:t>kibana</a:t>
-            </a:r>
-            <a:r>
-              <a:rPr lang="en-US" baseline="0" dirty="0" smtClean="0"/>
-              <a:t>.</a:t>
-            </a:r>
-          </a:p>
-          <a:p>
-            <a:r>
-              <a:rPr lang="en-US" baseline="0" dirty="0" smtClean="0"/>
-              <a:t>Once in </a:t>
-            </a:r>
-            <a:r>
-              <a:rPr lang="en-US" baseline="0" dirty="0" err="1" smtClean="0"/>
-              <a:t>kibana</a:t>
-            </a:r>
-            <a:r>
-              <a:rPr lang="en-US" baseline="0" dirty="0" smtClean="0"/>
-              <a:t>, describe all the parts of the default dashboard.</a:t>
-            </a:r>
-          </a:p>
-          <a:p>
-            <a:r>
-              <a:rPr lang="en-US" baseline="0" dirty="0" smtClean="0"/>
-              <a:t>Much more slowly describe how I am using the dashboards.</a:t>
-            </a:r>
-          </a:p>
-          <a:p>
-            <a:pPr marL="0" marR="0" indent="0" algn="l" defTabSz="457200" rtl="0" eaLnBrk="1" fontAlgn="auto" latinLnBrk="0" hangingPunct="1">
-              <a:lnSpc>
-                <a:spcPct val="100000"/>
-              </a:lnSpc>
-              <a:spcBef>
-                <a:spcPts val="0"/>
-              </a:spcBef>
-              <a:spcAft>
-                <a:spcPts val="0"/>
-              </a:spcAft>
-              <a:buClrTx/>
-              <a:buSzTx/>
-              <a:buFontTx/>
-              <a:buNone/>
-              <a:tabLst/>
-              <a:defRPr/>
-            </a:pPr>
-            <a:r>
-              <a:rPr lang="en-US" baseline="0" dirty="0" smtClean="0"/>
-              <a:t>In </a:t>
-            </a:r>
-            <a:r>
-              <a:rPr lang="en-US" baseline="0" dirty="0" err="1" smtClean="0"/>
-              <a:t>kibana</a:t>
-            </a:r>
-            <a:r>
-              <a:rPr lang="en-US" baseline="0" dirty="0" smtClean="0"/>
-              <a:t> – dragging across the graph, show how clicking on mag-glass creates filters, filters + queries</a:t>
-            </a:r>
-          </a:p>
-          <a:p>
-            <a:endParaRPr lang="en-US" baseline="0" dirty="0" smtClean="0"/>
-          </a:p>
-          <a:p>
-            <a:r>
-              <a:rPr lang="en-US" baseline="0" dirty="0" err="1" smtClean="0"/>
-              <a:t>Kibana</a:t>
-            </a:r>
-            <a:r>
-              <a:rPr lang="en-US" baseline="0" dirty="0" smtClean="0"/>
-              <a:t> doesn’t know anything about your app or your logs</a:t>
-            </a:r>
-          </a:p>
-          <a:p>
-            <a:endParaRPr lang="en-US" baseline="0" dirty="0" smtClean="0"/>
-          </a:p>
-          <a:p>
-            <a:r>
-              <a:rPr lang="en-US" baseline="0" dirty="0" smtClean="0"/>
-              <a:t>Talk about all of the fields in the full event</a:t>
-            </a:r>
-          </a:p>
-          <a:p>
-            <a:endParaRPr lang="en-US" baseline="0" dirty="0" smtClean="0"/>
-          </a:p>
-          <a:p>
-            <a:r>
-              <a:rPr lang="en-US" baseline="0" dirty="0" smtClean="0"/>
-              <a:t>Request overview dashboard = access log centric</a:t>
-            </a:r>
-          </a:p>
-          <a:p>
-            <a:endParaRPr lang="en-US" baseline="0" dirty="0" smtClean="0"/>
-          </a:p>
-          <a:p>
-            <a:r>
-              <a:rPr lang="en-US" baseline="0" dirty="0" smtClean="0"/>
-              <a:t>Discuss </a:t>
-            </a:r>
-            <a:r>
-              <a:rPr lang="en-US" baseline="0" dirty="0" err="1" smtClean="0"/>
-              <a:t>logstash</a:t>
-            </a:r>
-            <a:r>
-              <a:rPr lang="en-US" baseline="0" dirty="0" smtClean="0"/>
-              <a:t> </a:t>
-            </a:r>
-            <a:r>
-              <a:rPr lang="en-US" baseline="0" dirty="0" err="1" smtClean="0"/>
-              <a:t>config</a:t>
-            </a:r>
-            <a:r>
-              <a:rPr lang="en-US" baseline="0" dirty="0" smtClean="0"/>
-              <a:t> and talk about running </a:t>
-            </a:r>
-            <a:r>
-              <a:rPr lang="en-US" baseline="0" dirty="0" err="1" smtClean="0"/>
-              <a:t>logstash</a:t>
-            </a:r>
-            <a:r>
-              <a:rPr lang="en-US" baseline="0" dirty="0" smtClean="0"/>
-              <a:t> and </a:t>
-            </a:r>
-            <a:r>
-              <a:rPr lang="en-US" baseline="0" dirty="0" err="1" smtClean="0"/>
-              <a:t>elasticsearch</a:t>
-            </a:r>
-            <a:r>
-              <a:rPr lang="en-US" baseline="0" dirty="0" smtClean="0"/>
-              <a:t> on laptop</a:t>
-            </a:r>
-          </a:p>
-          <a:p>
-            <a:endParaRPr lang="en-US" baseline="0" dirty="0" smtClean="0"/>
-          </a:p>
-          <a:p>
-            <a:r>
-              <a:rPr lang="en-US" baseline="0" dirty="0" smtClean="0"/>
-              <a:t>On the first dashboard describe each element of </a:t>
-            </a:r>
-            <a:r>
-              <a:rPr lang="en-US" baseline="0" dirty="0" err="1" smtClean="0"/>
-              <a:t>kibana</a:t>
-            </a:r>
-            <a:r>
-              <a:rPr lang="en-US" baseline="0" dirty="0" smtClean="0"/>
-              <a:t> – once I find the problem (either too long or a blow up) show the share link.</a:t>
-            </a:r>
-          </a:p>
-          <a:p>
-            <a:endParaRPr lang="en-US" baseline="0" dirty="0" smtClean="0"/>
-          </a:p>
-          <a:p>
-            <a:endParaRPr lang="en-US" baseline="0" dirty="0" smtClean="0"/>
-          </a:p>
-          <a:p>
-            <a:endParaRPr lang="en-US" baseline="0" dirty="0" smtClean="0"/>
-          </a:p>
-          <a:p>
-            <a:endParaRPr lang="en-US" dirty="0" smtClean="0"/>
-          </a:p>
-          <a:p>
-            <a:endParaRPr lang="en-US" baseline="0" dirty="0" smtClean="0"/>
-          </a:p>
-          <a:p>
+              <a:rPr lang="en-US" dirty="0" smtClean="0"/>
+              <a:t>Spring boot</a:t>
+            </a:r>
+          </a:p>
+          <a:p>
+            <a:r>
+              <a:rPr lang="en-US" dirty="0" smtClean="0"/>
+              <a:t>Spring boot actuator health checks</a:t>
+            </a:r>
+          </a:p>
+          <a:p>
+            <a:r>
+              <a:rPr lang="en-US" dirty="0" smtClean="0"/>
+              <a:t>Gatling Load test tool</a:t>
+            </a:r>
             <a:endParaRPr lang="en-US" dirty="0"/>
           </a:p>
         </p:txBody>
@@ -2984,34 +2892,12 @@
           <a:lstStyle/>
           <a:p>
             <a:r>
-              <a:rPr lang="en-US" dirty="0" smtClean="0"/>
-              <a:t>Highly influenced by Google</a:t>
-            </a:r>
-            <a:r>
               <a:rPr lang="en-US" baseline="0" dirty="0" smtClean="0"/>
-              <a:t> Dapper paper (open source implementation = </a:t>
+              <a:t>When starting demo describe </a:t>
             </a:r>
             <a:r>
               <a:rPr lang="en-US" baseline="0" dirty="0" err="1" smtClean="0"/>
-              <a:t>Zipkin</a:t>
-            </a:r>
-            <a:r>
-              <a:rPr lang="en-US" baseline="0" dirty="0" smtClean="0"/>
-              <a:t>)</a:t>
-            </a:r>
-          </a:p>
-          <a:p>
-            <a:r>
-              <a:rPr lang="en-US" dirty="0" smtClean="0"/>
-              <a:t>Open source alternatives</a:t>
-            </a:r>
-            <a:r>
-              <a:rPr lang="en-US" baseline="0" dirty="0" smtClean="0"/>
-              <a:t> for the </a:t>
-            </a:r>
-            <a:r>
-              <a:rPr lang="en-US" baseline="0" dirty="0" err="1" smtClean="0"/>
-              <a:t>logback</a:t>
+              <a:t>logstash</a:t>
             </a:r>
             <a:r>
               <a:rPr lang="en-US" baseline="0" dirty="0" smtClean="0"/>
@@ -3019,12 +2905,193 @@
             </a:r>
             <a:r>
               <a:rPr lang="en-US" baseline="0" dirty="0" err="1" smtClean="0"/>
-              <a:t>logback</a:t>
+              <a:t>elasticsearch</a:t>
             </a:r>
             <a:r>
               <a:rPr lang="en-US" baseline="0" dirty="0" smtClean="0"/>
-              <a:t>-access encoders, we pre-date them, so we are investigating how to switch..</a:t>
-            </a:r>
+              <a:t> are running locally (with command line) and then show </a:t>
+            </a:r>
+            <a:r>
+              <a:rPr lang="en-US" baseline="0" dirty="0" err="1" smtClean="0"/>
+              <a:t>logstash</a:t>
+            </a:r>
+            <a:r>
+              <a:rPr lang="en-US" baseline="0" dirty="0" smtClean="0"/>
+              <a:t> </a:t>
+            </a:r>
+            <a:r>
+              <a:rPr lang="en-US" baseline="0" dirty="0" err="1" smtClean="0"/>
+              <a:t>config</a:t>
+            </a:r>
+            <a:r>
+              <a:rPr lang="en-US" baseline="0" dirty="0" smtClean="0"/>
+              <a:t> input and output before moving into </a:t>
+            </a:r>
+            <a:r>
+              <a:rPr lang="en-US" baseline="0" dirty="0" err="1" smtClean="0"/>
+              <a:t>kibana</a:t>
+            </a:r>
+            <a:r>
+              <a:rPr lang="en-US" baseline="0" dirty="0" smtClean="0"/>
+              <a:t>.</a:t>
+            </a:r>
+          </a:p>
+          <a:p>
+            <a:r>
+              <a:rPr lang="en-US" baseline="0" dirty="0" smtClean="0"/>
+              <a:t>Once in </a:t>
+            </a:r>
+            <a:r>
+              <a:rPr lang="en-US" baseline="0" dirty="0" err="1" smtClean="0"/>
+              <a:t>kibana</a:t>
+            </a:r>
+            <a:r>
+              <a:rPr lang="en-US" baseline="0" dirty="0" smtClean="0"/>
+              <a:t>, describe all the parts of the default dashboard.</a:t>
+            </a:r>
+          </a:p>
+          <a:p>
+            <a:r>
+              <a:rPr lang="en-US" baseline="0" dirty="0" smtClean="0"/>
+              <a:t>Much more slowly describe how I am using the dashboards.</a:t>
+            </a:r>
+          </a:p>
+          <a:p>
+            <a:pPr marL="0" marR="0" indent="0" algn="l" defTabSz="457200" rtl="0" eaLnBrk="1" fontAlgn="auto" latinLnBrk="0" hangingPunct="1">
+              <a:lnSpc>
+                <a:spcPct val="100000"/>
+              </a:lnSpc>
+              <a:spcBef>
+                <a:spcPts val="0"/>
+              </a:spcBef>
+              <a:spcAft>
+                <a:spcPts val="0"/>
+              </a:spcAft>
+              <a:buClrTx/>
+              <a:buSzTx/>
+              <a:buFontTx/>
+              <a:buNone/>
+              <a:tabLst/>
+              <a:defRPr/>
+            </a:pPr>
+            <a:r>
+              <a:rPr lang="en-US" baseline="0" dirty="0" smtClean="0"/>
+              <a:t>In </a:t>
+            </a:r>
+            <a:r>
+              <a:rPr lang="en-US" baseline="0" dirty="0" err="1" smtClean="0"/>
+              <a:t>kibana</a:t>
+            </a:r>
+            <a:r>
+              <a:rPr lang="en-US" baseline="0" dirty="0" smtClean="0"/>
+              <a:t> – dragging across the graph, show how clicking on mag-glass creates filters, filters + queries</a:t>
+            </a:r>
+          </a:p>
+          <a:p>
+            <a:endParaRPr lang="en-US" baseline="0" dirty="0" smtClean="0"/>
+          </a:p>
+          <a:p>
+            <a:r>
+              <a:rPr lang="en-US" baseline="0" dirty="0" err="1" smtClean="0"/>
+              <a:t>Kibana</a:t>
+            </a:r>
+            <a:r>
+              <a:rPr lang="en-US" baseline="0" dirty="0" smtClean="0"/>
+              <a:t> doesn’t know anything about your app or your logs</a:t>
+            </a:r>
+          </a:p>
+          <a:p>
+            <a:endParaRPr lang="en-US" baseline="0" dirty="0" smtClean="0"/>
+          </a:p>
+          <a:p>
+            <a:r>
+              <a:rPr lang="en-US" baseline="0" dirty="0" smtClean="0"/>
+              <a:t>Talk about all of the fields in the full event</a:t>
+            </a:r>
+          </a:p>
+          <a:p>
+            <a:endParaRPr lang="en-US" baseline="0" dirty="0" smtClean="0"/>
+          </a:p>
+          <a:p>
+            <a:r>
+              <a:rPr lang="en-US" baseline="0" dirty="0" smtClean="0"/>
+              <a:t>Request overview dashboard = access log centric</a:t>
+            </a:r>
+          </a:p>
+          <a:p>
+            <a:endParaRPr lang="en-US" baseline="0" dirty="0" smtClean="0"/>
+          </a:p>
+          <a:p>
+            <a:r>
+              <a:rPr lang="en-US" baseline="0" dirty="0" smtClean="0"/>
+              <a:t>Discuss </a:t>
+            </a:r>
+            <a:r>
+              <a:rPr lang="en-US" baseline="0" dirty="0" err="1" smtClean="0"/>
+              <a:t>logstash</a:t>
+            </a:r>
+            <a:r>
+              <a:rPr lang="en-US" baseline="0" dirty="0" smtClean="0"/>
+              <a:t> </a:t>
+            </a:r>
+            <a:r>
+              <a:rPr lang="en-US" baseline="0" dirty="0" err="1" smtClean="0"/>
+              <a:t>config</a:t>
+            </a:r>
+            <a:r>
+              <a:rPr lang="en-US" baseline="0" dirty="0" smtClean="0"/>
+              <a:t> and talk about running </a:t>
+            </a:r>
+            <a:r>
+              <a:rPr lang="en-US" baseline="0" dirty="0" err="1" smtClean="0"/>
+              <a:t>logstash</a:t>
+            </a:r>
+            <a:r>
+              <a:rPr lang="en-US" baseline="0" dirty="0" smtClean="0"/>
+              <a:t> and </a:t>
+            </a:r>
+            <a:r>
+              <a:rPr lang="en-US" baseline="0" dirty="0" err="1" smtClean="0"/>
+              <a:t>elasticsearch</a:t>
+            </a:r>
+            <a:r>
+              <a:rPr lang="en-US" baseline="0" dirty="0" smtClean="0"/>
+              <a:t> on laptop</a:t>
+            </a:r>
+          </a:p>
+          <a:p>
+            <a:endParaRPr lang="en-US" baseline="0" dirty="0" smtClean="0"/>
+          </a:p>
+          <a:p>
+            <a:r>
+              <a:rPr lang="en-US" baseline="0" dirty="0" smtClean="0"/>
+              <a:t>On the first dashboard describe each element of </a:t>
+            </a:r>
+            <a:r>
+              <a:rPr lang="en-US" baseline="0" dirty="0" err="1" smtClean="0"/>
+              <a:t>kibana</a:t>
+            </a:r>
+            <a:r>
+              <a:rPr lang="en-US" baseline="0" dirty="0" smtClean="0"/>
+              <a:t> – once I find the problem (either too long or a blow up) show the share link.</a:t>
+            </a:r>
+          </a:p>
+          <a:p>
+            <a:endParaRPr lang="en-US" baseline="0" dirty="0" smtClean="0"/>
+          </a:p>
+          <a:p>
+            <a:endParaRPr lang="en-US" baseline="0" dirty="0" smtClean="0"/>
+          </a:p>
+          <a:p>
+            <a:endParaRPr lang="en-US" baseline="0" dirty="0" smtClean="0"/>
+          </a:p>
+          <a:p>
+            <a:endParaRPr lang="en-US" dirty="0" smtClean="0"/>
+          </a:p>
+          <a:p>
+            <a:endParaRPr lang="en-US" baseline="0" dirty="0" smtClean="0"/>
+          </a:p>
+          <a:p>
             <a:endParaRPr lang="en-US" dirty="0"/>
           </a:p>
         </p:txBody>
@@ -3110,6 +3177,132 @@
           <a:lstStyle/>
           <a:p>
             <a:r>
+              <a:rPr lang="en-US" dirty="0" smtClean="0"/>
+              <a:t>Highly influenced by Google</a:t>
+            </a:r>
+            <a:r>
+              <a:rPr lang="en-US" baseline="0" dirty="0" smtClean="0"/>
+              <a:t> Dapper paper (open source implementation = </a:t>
+            </a:r>
+            <a:r>
+              <a:rPr lang="en-US" baseline="0" dirty="0" err="1" smtClean="0"/>
+              <a:t>Zipkin</a:t>
+            </a:r>
+            <a:r>
+              <a:rPr lang="en-US" baseline="0" dirty="0" smtClean="0"/>
+              <a:t>)</a:t>
+            </a:r>
+          </a:p>
+          <a:p>
+            <a:r>
+              <a:rPr lang="en-US" dirty="0" smtClean="0"/>
+              <a:t>Open source alternatives</a:t>
+            </a:r>
+            <a:r>
+              <a:rPr lang="en-US" baseline="0" dirty="0" smtClean="0"/>
+              <a:t> for the </a:t>
+            </a:r>
+            <a:r>
+              <a:rPr lang="en-US" baseline="0" dirty="0" err="1" smtClean="0"/>
+              <a:t>logback</a:t>
+            </a:r>
+            <a:r>
+              <a:rPr lang="en-US" baseline="0" dirty="0" smtClean="0"/>
+              <a:t> and </a:t>
+            </a:r>
+            <a:r>
+              <a:rPr lang="en-US" baseline="0" dirty="0" err="1" smtClean="0"/>
+              <a:t>logback</a:t>
+            </a:r>
+            <a:r>
+              <a:rPr lang="en-US" baseline="0" dirty="0" smtClean="0"/>
+              <a:t>-access encoders, we pre-date them, so we are investigating how to switch..</a:t>
+            </a:r>
+            <a:endParaRPr lang="en-US" dirty="0"/>
+          </a:p>
+        </p:txBody>
+      </p:sp>
+      <p:sp>
+        <p:nvSpPr>
+          <p:cNvPr id="4" name="Slide Number Placeholder 3"/>
+          <p:cNvSpPr>
+            <a:spLocks noGrp="1"/>
+          </p:cNvSpPr>
+          <p:nvPr>
+            <p:ph type="sldNum" sz="quarter" idx="10"/>
+          </p:nvPr>
+        </p:nvSpPr>
+        <p:spPr/>
+        <p:txBody>
+          <a:bodyPr/>
+          <a:lstStyle/>
+          <a:p>
+            <a:fld id="{9EE0E4B5-1664-9E4D-908E-362B3D86519C}" type="slidenum">
+              <a:rPr lang="en-US" smtClean="0"/>
+              <a:t>28</a:t>
+            </a:fld>
+            <a:endParaRPr lang="en-US"/>
+          </a:p>
+        </p:txBody>
+      </p:sp>
+    </p:spTree>
+    <p:extLst>
+      <p:ext uri="{BB962C8B-B14F-4D97-AF65-F5344CB8AC3E}">
+        <p14:creationId xmlns:p14="http://schemas.microsoft.com/office/powerpoint/2010/main" val="284077081"/>
+      </p:ext>
+    </p:extLst>
+  </p:cSld>
+  <p:clrMapOvr>
+    <a:masterClrMapping/>
+  </p:clrMapOvr>
+</p:notes>
+</file>
+
+<file path=ppt/notesSlides/notesSlide29.xml><?xml version="1.0" encoding="utf-8"?>
+<p:notes xmlns:a="http://schemas.openxmlformats.org/drawingml/2006/main" xmlns:r="http://schemas.openxmlformats.org/officeDocument/2006/relationships" xmlns:p="http://schemas.openxmlformats.org/presentationml/2006/main">
+  <p:cSld>
+    <p:spTree>
+      <p:nvGrpSpPr>
+        <p:cNvPr id="1" name=""/>
+        <p:cNvGrpSpPr/>
+        <p:nvPr/>
+      </p:nvGrpSpPr>
+      <p:grpSpPr>
+        <a:xfrm>
+          <a:off x="0" y="0"/>
+          <a:ext cx="0" cy="0"/>
+          <a:chOff x="0" y="0"/>
+          <a:chExt cx="0" cy="0"/>
+        </a:xfrm>
+      </p:grpSpPr>
+      <p:sp>
+        <p:nvSpPr>
+          <p:cNvPr id="2" name="Slide Image Placeholder 1"/>
+          <p:cNvSpPr>
+            <a:spLocks noGrp="1" noRot="1" noChangeAspect="1"/>
+          </p:cNvSpPr>
+          <p:nvPr>
+            <p:ph type="sldImg"/>
+          </p:nvPr>
+        </p:nvSpPr>
+        <p:spPr/>
+      </p:sp>
+      <p:sp>
+        <p:nvSpPr>
+          <p:cNvPr id="3" name="Notes Placeholder 2"/>
+          <p:cNvSpPr>
+            <a:spLocks noGrp="1"/>
+          </p:cNvSpPr>
+          <p:nvPr>
+            <p:ph type="body" idx="1"/>
+          </p:nvPr>
+        </p:nvSpPr>
+        <p:spPr/>
+        <p:txBody>
+          <a:bodyPr/>
+          <a:lstStyle/>
+          <a:p>
+            <a:r>
               <a:rPr lang="en-US" dirty="0" err="1" smtClean="0"/>
               <a:t>Im</a:t>
             </a:r>
@@ -3151,7 +3344,7 @@
           <a:p>
             <a:fld id="{9EE0E4B5-1664-9E4D-908E-362B3D86519C}" type="slidenum">
               <a:rPr lang="en-US" smtClean="0"/>
-              <a:t>29</a:t>
+              <a:t>30</a:t>
             </a:fld>
             <a:endParaRPr lang="en-US"/>
           </a:p>
@@ -3733,7 +3926,7 @@
             </a:pPr>
             <a:r>
               <a:rPr lang="en-US" baseline="0" dirty="0" smtClean="0"/>
-              <a:t>No access (not even read) to production hosts.</a:t>
+              <a:t>To add insult to injury - No access (not even read) to production hosts.</a:t>
             </a:r>
           </a:p>
           <a:p>
@@ -7453,9 +7646,80 @@
   <p:timing>
     <p:tnLst>
       <p:par>
-        <p:cTn xmlns:p14="http://schemas.microsoft.com/office/powerpoint/2010/main" id="1" dur="indefinite" restart="never" nodeType="tmRoot"/>
+        <p:cTn xmlns:p14="http://schemas.microsoft.com/office/powerpoint/2010/main" id="1" dur="indefinite" restart="never" nodeType="tmRoot">
+          <p:childTnLst>
+            <p:seq concurrent="1" nextAc="seek">
+              <p:cTn id="2" dur="indefinite" nodeType="mainSeq">
+                <p:childTnLst>
+                  <p:par>
+                    <p:cTn id="3" fill="hold">
+                      <p:stCondLst>
+                        <p:cond delay="indefinite"/>
+                      </p:stCondLst>
+                      <p:childTnLst>
+                        <p:par>
+                          <p:cTn id="4" fill="hold">
+                            <p:stCondLst>
+                              <p:cond delay="0"/>
+                            </p:stCondLst>
+                            <p:childTnLst>
+                              <p:par>
+                                <p:cTn id="5" presetID="1" presetClass="entr" presetSubtype="0" fill="hold" grpId="0" nodeType="clickEffect">
+                                  <p:stCondLst>
+                                    <p:cond delay="0"/>
+                                  </p:stCondLst>
+                                  <p:childTnLst>
+                                    <p:set>
+                                      <p:cBhvr>
+                                        <p:cTn id="6" dur="1" fill="hold">
+                                          <p:stCondLst>
+                                            <p:cond delay="0"/>
+                                          </p:stCondLst>
+                                        </p:cTn>
+                                        <p:tgtEl>
+                                          <p:spTgt spid="3"/>
+                                        </p:tgtEl>
+                                        <p:attrNameLst>
+                                          <p:attrName>style.visibility</p:attrName>
+                                        </p:attrNameLst>
+                                      </p:cBhvr>
+                                      <p:to>
+                                        <p:strVal val="visible"/>
+                                      </p:to>
+                                    </p:set>
+                                  </p:childTnLst>
+                                </p:cTn>
+                              </p:par>
+                            </p:childTnLst>
+                          </p:cTn>
+                        </p:par>
+                      </p:childTnLst>
+                    </p:cTn>
+                  </p:par>
+                </p:childTnLst>
+              </p:cTn>
+              <p:prevCondLst>
+                <p:cond evt="onPrev" delay="0">
+                  <p:tgtEl>
+                    <p:sldTgt/>
+                  </p:tgtEl>
+                </p:cond>
+              </p:prevCondLst>
+              <p:nextCondLst>
+                <p:cond evt="onNext" delay="0">
+                  <p:tgtEl>
+                    <p:sldTgt/>
+                  </p:tgtEl>
+                </p:cond>
+              </p:nextCondLst>
+            </p:seq>
+          </p:childTnLst>
+        </p:cTn>
       </p:par>
     </p:tnLst>
+    <p:bldLst>
+      <p:bldP spid="3" grpId="0"/>
+    </p:bldLst>
   </p:timing>
 </p:sld>
 </file>
@@ -12208,6 +12472,265 @@
           <a:lstStyle/>
           <a:p>
             <a:r>
+              <a:rPr lang="en-US" sz="4400" dirty="0" err="1" smtClean="0"/>
+              <a:t>Json</a:t>
+            </a:r>
+            <a:r>
+              <a:rPr lang="en-US" sz="4400" dirty="0" smtClean="0"/>
+              <a:t> Logs</a:t>
+            </a:r>
+            <a:endParaRPr lang="en-US" sz="4400" dirty="0"/>
+          </a:p>
+        </p:txBody>
+      </p:sp>
+      <p:pic>
+        <p:nvPicPr>
+          <p:cNvPr id="5" name="Picture 4" descr="slf4j-logo.jpg"/>
+          <p:cNvPicPr>
+            <a:picLocks noChangeAspect="1"/>
+          </p:cNvPicPr>
+          <p:nvPr/>
+        </p:nvPicPr>
+        <p:blipFill>
+          <a:blip r:embed="rId3">
+            <a:alphaModFix amt="15000"/>
+            <a:extLst>
+              <a:ext uri="{28A0092B-C50C-407E-A947-70E740481C1C}">
+                <a14:useLocalDpi xmlns:a14="http://schemas.microsoft.com/office/drawing/2010/main" val="0"/>
+              </a:ext>
+            </a:extLst>
+          </a:blip>
+          <a:stretch>
+            <a:fillRect/>
+          </a:stretch>
+        </p:blipFill>
+        <p:spPr>
+          <a:xfrm>
+            <a:off x="0" y="-4827"/>
+            <a:ext cx="3400298" cy="1449307"/>
+          </a:xfrm>
+          <a:prstGeom prst="rect">
+            <a:avLst/>
+          </a:prstGeom>
+        </p:spPr>
+      </p:pic>
+      <p:pic>
+        <p:nvPicPr>
+          <p:cNvPr id="7" name="Picture 6" descr="tutorial-access-logs.png"/>
+          <p:cNvPicPr>
+            <a:picLocks noChangeAspect="1"/>
+          </p:cNvPicPr>
+          <p:nvPr/>
+        </p:nvPicPr>
+        <p:blipFill>
+          <a:blip r:embed="rId4">
+            <a:extLst>
+              <a:ext uri="{28A0092B-C50C-407E-A947-70E740481C1C}">
+                <a14:useLocalDpi xmlns:a14="http://schemas.microsoft.com/office/drawing/2010/main" val="0"/>
+              </a:ext>
+            </a:extLst>
+          </a:blip>
+          <a:stretch>
+            <a:fillRect/>
+          </a:stretch>
+        </p:blipFill>
+        <p:spPr>
+          <a:xfrm>
+            <a:off x="698199" y="1904338"/>
+            <a:ext cx="7507328" cy="4017683"/>
+          </a:xfrm>
+          <a:prstGeom prst="rect">
+            <a:avLst/>
+          </a:prstGeom>
+        </p:spPr>
+      </p:pic>
+      <p:pic>
+        <p:nvPicPr>
+          <p:cNvPr id="8" name="Picture 7" descr="Screen Shot 2015-01-01 at 2.02.03 PM.png"/>
+          <p:cNvPicPr>
+            <a:picLocks noChangeAspect="1"/>
+          </p:cNvPicPr>
+          <p:nvPr/>
+        </p:nvPicPr>
+        <p:blipFill>
+          <a:blip r:embed="rId5">
+            <a:extLst>
+              <a:ext uri="{28A0092B-C50C-407E-A947-70E740481C1C}">
+                <a14:useLocalDpi xmlns:a14="http://schemas.microsoft.com/office/drawing/2010/main" val="0"/>
+              </a:ext>
+            </a:extLst>
+          </a:blip>
+          <a:stretch>
+            <a:fillRect/>
+          </a:stretch>
+        </p:blipFill>
+        <p:spPr>
+          <a:xfrm>
+            <a:off x="457200" y="2264421"/>
+            <a:ext cx="9144000" cy="3657600"/>
+          </a:xfrm>
+          <a:prstGeom prst="rect">
+            <a:avLst/>
+          </a:prstGeom>
+        </p:spPr>
+      </p:pic>
+    </p:spTree>
+    <p:extLst>
+      <p:ext uri="{BB962C8B-B14F-4D97-AF65-F5344CB8AC3E}">
+        <p14:creationId xmlns:p14="http://schemas.microsoft.com/office/powerpoint/2010/main" val="3455249129"/>
+      </p:ext>
+    </p:extLst>
+  </p:cSld>
+  <p:clrMapOvr>
+    <a:masterClrMapping/>
+  </p:clrMapOvr>
+  <p:timing>
+    <p:tnLst>
+      <p:par>
+        <p:cTn xmlns:p14="http://schemas.microsoft.com/office/powerpoint/2010/main" id="1" dur="indefinite" restart="never" nodeType="tmRoot">
+          <p:childTnLst>
+            <p:seq concurrent="1" nextAc="seek">
+              <p:cTn id="2" dur="indefinite" nodeType="mainSeq">
+                <p:childTnLst>
+                  <p:par>
+                    <p:cTn id="3" fill="hold">
+                      <p:stCondLst>
+                        <p:cond delay="indefinite"/>
+                      </p:stCondLst>
+                      <p:childTnLst>
+                        <p:par>
+                          <p:cTn id="4" fill="hold">
+                            <p:stCondLst>
+                              <p:cond delay="0"/>
+                            </p:stCondLst>
+                            <p:childTnLst>
+                              <p:par>
+                                <p:cTn id="5" presetID="1" presetClass="exit" presetSubtype="0" fill="hold" nodeType="clickEffect">
+                                  <p:stCondLst>
+                                    <p:cond delay="0"/>
+                                  </p:stCondLst>
+                                  <p:childTnLst>
+                                    <p:set>
+                                      <p:cBhvr>
+                                        <p:cTn id="6" dur="1" fill="hold">
+                                          <p:stCondLst>
+                                            <p:cond delay="0"/>
+                                          </p:stCondLst>
+                                        </p:cTn>
+                                        <p:tgtEl>
+                                          <p:spTgt spid="7"/>
+                                        </p:tgtEl>
+                                        <p:attrNameLst>
+                                          <p:attrName>style.visibility</p:attrName>
+                                        </p:attrNameLst>
+                                      </p:cBhvr>
+                                      <p:to>
+                                        <p:strVal val="hidden"/>
+                                      </p:to>
+                                    </p:set>
+                                  </p:childTnLst>
+                                </p:cTn>
+                              </p:par>
+                            </p:childTnLst>
+                          </p:cTn>
+                        </p:par>
+                        <p:par>
+                          <p:cTn id="7" fill="hold">
+                            <p:stCondLst>
+                              <p:cond delay="0"/>
+                            </p:stCondLst>
+                            <p:childTnLst>
+                              <p:par>
+                                <p:cTn id="8" presetID="1" presetClass="entr" presetSubtype="0" fill="hold" nodeType="afterEffect">
+                                  <p:stCondLst>
+                                    <p:cond delay="0"/>
+                                  </p:stCondLst>
+                                  <p:childTnLst>
+                                    <p:set>
+                                      <p:cBhvr>
+                                        <p:cTn id="9" dur="1" fill="hold">
+                                          <p:stCondLst>
+                                            <p:cond delay="0"/>
+                                          </p:stCondLst>
+                                        </p:cTn>
+                                        <p:tgtEl>
+                                          <p:spTgt spid="8"/>
+                                        </p:tgtEl>
+                                        <p:attrNameLst>
+                                          <p:attrName>style.visibility</p:attrName>
+                                        </p:attrNameLst>
+                                      </p:cBhvr>
+                                      <p:to>
+                                        <p:strVal val="visible"/>
+                                      </p:to>
+                                    </p:set>
+                                  </p:childTnLst>
+                                </p:cTn>
+                              </p:par>
+                            </p:childTnLst>
+                          </p:cTn>
+                        </p:par>
+                      </p:childTnLst>
+                    </p:cTn>
+                  </p:par>
+                </p:childTnLst>
+              </p:cTn>
+              <p:prevCondLst>
+                <p:cond evt="onPrev" delay="0">
+                  <p:tgtEl>
+                    <p:sldTgt/>
+                  </p:tgtEl>
+                </p:cond>
+              </p:prevCondLst>
+              <p:nextCondLst>
+                <p:cond evt="onNext" delay="0">
+                  <p:tgtEl>
+                    <p:sldTgt/>
+                  </p:tgtEl>
+                </p:cond>
+              </p:nextCondLst>
+            </p:seq>
+          </p:childTnLst>
+        </p:cTn>
+      </p:par>
+    </p:tnLst>
+  </p:timing>
+</p:sld>
+</file>
+
+<file path=ppt/slides/slide25.xml><?xml version="1.0" encoding="utf-8"?>
+<p:sld xmlns:a="http://schemas.openxmlformats.org/drawingml/2006/main" xmlns:r="http://schemas.openxmlformats.org/officeDocument/2006/relationships" xmlns:p="http://schemas.openxmlformats.org/presentationml/2006/main">
+  <p:cSld>
+    <p:spTree>
+      <p:nvGrpSpPr>
+        <p:cNvPr id="1" name=""/>
+        <p:cNvGrpSpPr/>
+        <p:nvPr/>
+      </p:nvGrpSpPr>
+      <p:grpSpPr>
+        <a:xfrm>
+          <a:off x="0" y="0"/>
+          <a:ext cx="0" cy="0"/>
+          <a:chOff x="0" y="0"/>
+          <a:chExt cx="0" cy="0"/>
+        </a:xfrm>
+      </p:grpSpPr>
+      <p:sp>
+        <p:nvSpPr>
+          <p:cNvPr id="2" name="Title 1"/>
+          <p:cNvSpPr>
+            <a:spLocks noGrp="1"/>
+          </p:cNvSpPr>
+          <p:nvPr>
+            <p:ph type="title"/>
+          </p:nvPr>
+        </p:nvSpPr>
+        <p:spPr/>
+        <p:txBody>
+          <a:bodyPr/>
+          <a:lstStyle/>
+          <a:p>
+            <a:r>
               <a:rPr lang="en-US" dirty="0" smtClean="0"/>
               <a:t>Demo</a:t>
             </a:r>
@@ -12265,7 +12788,7 @@
 </p:sld>
 </file>
 
-<file path=ppt/slides/slide25.xml><?xml version="1.0" encoding="utf-8"?>
+<file path=ppt/slides/slide26.xml><?xml version="1.0" encoding="utf-8"?>
 <p:sld xmlns:a="http://schemas.openxmlformats.org/drawingml/2006/main" xmlns:r="http://schemas.openxmlformats.org/officeDocument/2006/relationships" xmlns:p="http://schemas.openxmlformats.org/presentationml/2006/main">
   <p:cSld>
     <p:spTree>
@@ -12461,7 +12984,7 @@
 </p:sld>
 </file>
 
-<file path=ppt/slides/slide26.xml><?xml version="1.0" encoding="utf-8"?>
+<file path=ppt/slides/slide27.xml><?xml version="1.0" encoding="utf-8"?>
 <p:sld xmlns:a="http://schemas.openxmlformats.org/drawingml/2006/main" xmlns:r="http://schemas.openxmlformats.org/officeDocument/2006/relationships" xmlns:p="http://schemas.openxmlformats.org/presentationml/2006/main">
   <p:cSld>
     <p:spTree>
@@ -12582,7 +13105,7 @@
 </p:sld>
 </file>
 
-<file path=ppt/slides/slide27.xml><?xml version="1.0" encoding="utf-8"?>
+<file path=ppt/slides/slide28.xml><?xml version="1.0" encoding="utf-8"?>
 <p:sld xmlns:a="http://schemas.openxmlformats.org/drawingml/2006/main" xmlns:r="http://schemas.openxmlformats.org/officeDocument/2006/relationships" xmlns:p="http://schemas.openxmlformats.org/presentationml/2006/main">
   <p:cSld>
     <p:spTree>
@@ -12781,277 +13304,6 @@
     <p:extLst>
       <p:ext uri="{BB962C8B-B14F-4D97-AF65-F5344CB8AC3E}">
         <p14:creationId xmlns:p14="http://schemas.microsoft.com/office/powerpoint/2010/main" val="2070180964"/>
-      </p:ext>
-    </p:extLst>
-  </p:cSld>
-  <p:clrMapOvr>
-    <a:masterClrMapping/>
-  </p:clrMapOvr>
-  <p:timing>
-    <p:tnLst>
-      <p:par>
-        <p:cTn xmlns:p14="http://schemas.microsoft.com/office/powerpoint/2010/main" id="1" dur="indefinite" restart="never" nodeType="tmRoot"/>
-      </p:par>
-    </p:tnLst>
-  </p:timing>
-</p:sld>
-</file>
-
-<file path=ppt/slides/slide28.xml><?xml version="1.0" encoding="utf-8"?>
-<p:sld xmlns:a="http://schemas.openxmlformats.org/drawingml/2006/main" xmlns:r="http://schemas.openxmlformats.org/officeDocument/2006/relationships" xmlns:p="http://schemas.openxmlformats.org/presentationml/2006/main">
-  <p:cSld>
-    <p:spTree>
-      <p:nvGrpSpPr>
-        <p:cNvPr id="1" name=""/>
-        <p:cNvGrpSpPr/>
-        <p:nvPr/>
-      </p:nvGrpSpPr>
-      <p:grpSpPr>
-        <a:xfrm>
-          <a:off x="0" y="0"/>
-          <a:ext cx="0" cy="0"/>
-          <a:chOff x="0" y="0"/>
-          <a:chExt cx="0" cy="0"/>
-        </a:xfrm>
-      </p:grpSpPr>
-      <p:sp>
-        <p:nvSpPr>
-          <p:cNvPr id="2" name="Title 1"/>
-          <p:cNvSpPr>
-            <a:spLocks noGrp="1"/>
-          </p:cNvSpPr>
-          <p:nvPr>
-            <p:ph type="title"/>
-          </p:nvPr>
-        </p:nvSpPr>
-        <p:spPr/>
-        <p:txBody>
-          <a:bodyPr/>
-          <a:lstStyle/>
-          <a:p>
-            <a:r>
-              <a:rPr lang="en-US" dirty="0" smtClean="0"/>
-              <a:t>Resources</a:t>
-            </a:r>
-            <a:endParaRPr lang="en-US" dirty="0"/>
-          </a:p>
-        </p:txBody>
-      </p:sp>
-      <p:sp>
-        <p:nvSpPr>
-          <p:cNvPr id="3" name="Content Placeholder 2"/>
-          <p:cNvSpPr>
-            <a:spLocks noGrp="1"/>
-          </p:cNvSpPr>
-          <p:nvPr>
-            <p:ph idx="1"/>
-          </p:nvPr>
-        </p:nvSpPr>
-        <p:spPr/>
-        <p:txBody>
-          <a:bodyPr>
-            <a:normAutofit fontScale="92500" lnSpcReduction="10000"/>
-          </a:bodyPr>
-          <a:lstStyle/>
-          <a:p>
-            <a:endParaRPr lang="en-US" dirty="0" smtClean="0">
-              <a:hlinkClick r:id="rId2"/>
-            </a:endParaRPr>
-          </a:p>
-          <a:p>
-            <a:r>
-              <a:rPr lang="en-US" dirty="0">
-                <a:hlinkClick r:id="rId2"/>
-              </a:rPr>
-              <a:t>https://github.com/solidjb/elk-</a:t>
-            </a:r>
-            <a:r>
-              <a:rPr lang="en-US" dirty="0" smtClean="0">
-                <a:hlinkClick r:id="rId2"/>
-              </a:rPr>
-              <a:t>demo</a:t>
-            </a:r>
-          </a:p>
-          <a:p>
-            <a:r>
-              <a:rPr lang="en-US" dirty="0" smtClean="0">
-                <a:hlinkClick r:id="rId2"/>
-              </a:rPr>
-              <a:t>http</a:t>
-            </a:r>
-            <a:r>
-              <a:rPr lang="en-US" dirty="0">
-                <a:hlinkClick r:id="rId2"/>
-              </a:rPr>
-              <a:t>://logstash.net</a:t>
-            </a:r>
-            <a:r>
-              <a:rPr lang="en-US" dirty="0" smtClean="0">
-                <a:hlinkClick r:id="rId2"/>
-              </a:rPr>
-              <a:t>/</a:t>
-            </a:r>
-            <a:endParaRPr lang="en-US" dirty="0" smtClean="0"/>
-          </a:p>
-          <a:p>
-            <a:r>
-              <a:rPr lang="en-US" dirty="0">
-                <a:hlinkClick r:id="rId3"/>
-              </a:rPr>
-              <a:t>http://www.elasticsearch.org</a:t>
-            </a:r>
-            <a:r>
-              <a:rPr lang="en-US" dirty="0" smtClean="0">
-                <a:hlinkClick r:id="rId3"/>
-              </a:rPr>
-              <a:t>/</a:t>
-            </a:r>
-            <a:endParaRPr lang="en-US" dirty="0" smtClean="0"/>
-          </a:p>
-          <a:p>
-            <a:r>
-              <a:rPr lang="en-US" dirty="0">
-                <a:hlinkClick r:id="rId4"/>
-              </a:rPr>
-              <a:t>http://www.elasticsearch.org/overview/kibana</a:t>
-            </a:r>
-            <a:r>
-              <a:rPr lang="en-US" dirty="0" smtClean="0">
-                <a:hlinkClick r:id="rId4"/>
-              </a:rPr>
-              <a:t>/</a:t>
-            </a:r>
-            <a:endParaRPr lang="en-US" dirty="0" smtClean="0"/>
-          </a:p>
-          <a:p>
-            <a:r>
-              <a:rPr lang="en-US" dirty="0" smtClean="0">
-                <a:hlinkClick r:id="rId5"/>
-              </a:rPr>
-              <a:t>http</a:t>
-            </a:r>
-            <a:r>
-              <a:rPr lang="en-US" dirty="0">
-                <a:hlinkClick r:id="rId5"/>
-              </a:rPr>
-              <a:t>://projects.spring.io/spring-boot</a:t>
-            </a:r>
-            <a:r>
-              <a:rPr lang="en-US" dirty="0" smtClean="0">
-                <a:hlinkClick r:id="rId5"/>
-              </a:rPr>
-              <a:t>/</a:t>
-            </a:r>
-            <a:endParaRPr lang="en-US" dirty="0" smtClean="0"/>
-          </a:p>
-          <a:p>
-            <a:r>
-              <a:rPr lang="en-US" dirty="0">
-                <a:hlinkClick r:id="rId6"/>
-              </a:rPr>
-              <a:t>http://www.slf4j.org</a:t>
-            </a:r>
-            <a:r>
-              <a:rPr lang="en-US" dirty="0" smtClean="0">
-                <a:hlinkClick r:id="rId6"/>
-              </a:rPr>
-              <a:t>/</a:t>
-            </a:r>
-            <a:endParaRPr lang="en-US" dirty="0" smtClean="0"/>
-          </a:p>
-          <a:p>
-            <a:r>
-              <a:rPr lang="en-US" dirty="0">
-                <a:hlinkClick r:id="rId7"/>
-              </a:rPr>
-              <a:t>http://logback.qos.ch</a:t>
-            </a:r>
-            <a:r>
-              <a:rPr lang="en-US" dirty="0" smtClean="0">
-                <a:hlinkClick r:id="rId7"/>
-              </a:rPr>
-              <a:t>/</a:t>
-            </a:r>
-            <a:endParaRPr lang="en-US" dirty="0" smtClean="0"/>
-          </a:p>
-          <a:p>
-            <a:r>
-              <a:rPr lang="en-US" dirty="0" smtClean="0">
-                <a:hlinkClick r:id="rId8"/>
-              </a:rPr>
-              <a:t>http</a:t>
-            </a:r>
-            <a:r>
-              <a:rPr lang="en-US" dirty="0">
-                <a:hlinkClick r:id="rId8"/>
-              </a:rPr>
-              <a:t>://gatling.io</a:t>
-            </a:r>
-            <a:r>
-              <a:rPr lang="en-US" dirty="0" smtClean="0">
-                <a:hlinkClick r:id="rId8"/>
-              </a:rPr>
-              <a:t>/</a:t>
-            </a:r>
-            <a:endParaRPr lang="en-US" dirty="0" smtClean="0"/>
-          </a:p>
-          <a:p>
-            <a:r>
-              <a:rPr lang="en-US" dirty="0">
-                <a:hlinkClick r:id="rId9"/>
-              </a:rPr>
-              <a:t>http://research.google.com/pubs/pub36356.</a:t>
-            </a:r>
-            <a:r>
-              <a:rPr lang="en-US" dirty="0" smtClean="0">
-                <a:hlinkClick r:id="rId9"/>
-              </a:rPr>
-              <a:t>html</a:t>
-            </a:r>
-            <a:endParaRPr lang="en-US" dirty="0" smtClean="0"/>
-          </a:p>
-          <a:p>
-            <a:r>
-              <a:rPr lang="en-US" dirty="0">
-                <a:hlinkClick r:id="rId10"/>
-              </a:rPr>
-              <a:t>http://twitter.github.io/zipkin</a:t>
-            </a:r>
-            <a:r>
-              <a:rPr lang="en-US" dirty="0" smtClean="0">
-                <a:hlinkClick r:id="rId10"/>
-              </a:rPr>
-              <a:t>/</a:t>
-            </a:r>
-            <a:endParaRPr lang="en-US" dirty="0" smtClean="0"/>
-          </a:p>
-          <a:p>
-            <a:r>
-              <a:rPr lang="en-US" dirty="0">
-                <a:hlinkClick r:id="rId11"/>
-              </a:rPr>
-              <a:t>http://oclc.org/careers.en.html</a:t>
-            </a:r>
-            <a:endParaRPr lang="en-US" dirty="0"/>
-          </a:p>
-          <a:p>
-            <a:endParaRPr lang="en-US" dirty="0" smtClean="0"/>
-          </a:p>
-          <a:p>
-            <a:pPr marL="0" indent="0">
-              <a:buNone/>
-            </a:pPr>
-            <a:endParaRPr lang="en-US" dirty="0"/>
-          </a:p>
-          <a:p>
-            <a:endParaRPr lang="en-US" dirty="0"/>
-          </a:p>
-        </p:txBody>
-      </p:sp>
-    </p:spTree>
-    <p:extLst>
-      <p:ext uri="{BB962C8B-B14F-4D97-AF65-F5344CB8AC3E}">
-        <p14:creationId xmlns:p14="http://schemas.microsoft.com/office/powerpoint/2010/main" val="3193187975"/>
       </p:ext>
     </p:extLst>
   </p:cSld>
@@ -13102,7 +13354,7 @@
           <a:p>
             <a:r>
               <a:rPr lang="en-US" dirty="0" smtClean="0"/>
-              <a:t>Jonathan Baker</a:t>
+              <a:t>Resources</a:t>
             </a:r>
             <a:endParaRPr lang="en-US" dirty="0"/>
           </a:p>
@@ -13118,170 +13370,211 @@
             <p:ph idx="1"/>
           </p:nvPr>
         </p:nvSpPr>
-        <p:spPr>
-          <a:xfrm>
-            <a:off x="457200" y="4691187"/>
-            <a:ext cx="8229600" cy="1434976"/>
-          </a:xfrm>
-        </p:spPr>
+        <p:spPr/>
         <p:txBody>
           <a:bodyPr>
-            <a:normAutofit fontScale="92500"/>
+            <a:normAutofit fontScale="92500" lnSpcReduction="10000"/>
           </a:bodyPr>
           <a:lstStyle/>
+          <a:p>
+            <a:endParaRPr lang="en-US" dirty="0" smtClean="0">
+              <a:hlinkClick r:id="rId2"/>
+            </a:endParaRPr>
+          </a:p>
+          <a:p>
+            <a:r>
+              <a:rPr lang="en-US" dirty="0">
+                <a:hlinkClick r:id="rId2"/>
+              </a:rPr>
+              <a:t>https://github.com/solidjb/elk-</a:t>
+            </a:r>
+            <a:r>
+              <a:rPr lang="en-US" dirty="0" smtClean="0">
+                <a:hlinkClick r:id="rId2"/>
+              </a:rPr>
+              <a:t>demo</a:t>
+            </a:r>
+          </a:p>
+          <a:p>
+            <a:r>
+              <a:rPr lang="en-US" dirty="0" smtClean="0">
+                <a:hlinkClick r:id="rId2"/>
+              </a:rPr>
+              <a:t>http</a:t>
+            </a:r>
+            <a:r>
+              <a:rPr lang="en-US" dirty="0">
+                <a:hlinkClick r:id="rId2"/>
+              </a:rPr>
+              <a:t>://logstash.net</a:t>
+            </a:r>
+            <a:r>
+              <a:rPr lang="en-US" dirty="0" smtClean="0">
+                <a:hlinkClick r:id="rId2"/>
+              </a:rPr>
+              <a:t>/</a:t>
+            </a:r>
+            <a:endParaRPr lang="en-US" dirty="0" smtClean="0"/>
+          </a:p>
+          <a:p>
+            <a:r>
+              <a:rPr lang="en-US" dirty="0">
+                <a:hlinkClick r:id="rId3"/>
+              </a:rPr>
+              <a:t>http://www.elasticsearch.org</a:t>
+            </a:r>
+            <a:r>
+              <a:rPr lang="en-US" dirty="0" smtClean="0">
+                <a:hlinkClick r:id="rId3"/>
+              </a:rPr>
+              <a:t>/</a:t>
+            </a:r>
+            <a:endParaRPr lang="en-US" dirty="0" smtClean="0"/>
+          </a:p>
+          <a:p>
+            <a:r>
+              <a:rPr lang="en-US" dirty="0">
+                <a:hlinkClick r:id="rId4"/>
+              </a:rPr>
+              <a:t>http://www.elasticsearch.org/overview/kibana</a:t>
+            </a:r>
+            <a:r>
+              <a:rPr lang="en-US" dirty="0" smtClean="0">
+                <a:hlinkClick r:id="rId4"/>
+              </a:rPr>
+              <a:t>/</a:t>
+            </a:r>
+            <a:endParaRPr lang="en-US" dirty="0" smtClean="0"/>
+          </a:p>
+          <a:p>
+            <a:r>
+              <a:rPr lang="en-US" dirty="0" smtClean="0">
+                <a:hlinkClick r:id="rId5"/>
+              </a:rPr>
+              <a:t>http</a:t>
+            </a:r>
+            <a:r>
+              <a:rPr lang="en-US" dirty="0">
+                <a:hlinkClick r:id="rId5"/>
+              </a:rPr>
+              <a:t>://projects.spring.io/spring-boot</a:t>
+            </a:r>
+            <a:r>
+              <a:rPr lang="en-US" dirty="0" smtClean="0">
+                <a:hlinkClick r:id="rId5"/>
+              </a:rPr>
+              <a:t>/</a:t>
+            </a:r>
+            <a:endParaRPr lang="en-US" dirty="0" smtClean="0"/>
+          </a:p>
+          <a:p>
+            <a:r>
+              <a:rPr lang="en-US" dirty="0">
+                <a:hlinkClick r:id="rId6"/>
+              </a:rPr>
+              <a:t>http://www.slf4j.org</a:t>
+            </a:r>
+            <a:r>
+              <a:rPr lang="en-US" dirty="0" smtClean="0">
+                <a:hlinkClick r:id="rId6"/>
+              </a:rPr>
+              <a:t>/</a:t>
+            </a:r>
+            <a:endParaRPr lang="en-US" dirty="0" smtClean="0"/>
+          </a:p>
+          <a:p>
+            <a:r>
+              <a:rPr lang="en-US" dirty="0">
+                <a:hlinkClick r:id="rId7"/>
+              </a:rPr>
+              <a:t>http://logback.qos.ch</a:t>
+            </a:r>
+            <a:r>
+              <a:rPr lang="en-US" dirty="0" smtClean="0">
+                <a:hlinkClick r:id="rId7"/>
+              </a:rPr>
+              <a:t>/</a:t>
+            </a:r>
+            <a:endParaRPr lang="en-US" dirty="0" smtClean="0"/>
+          </a:p>
+          <a:p>
+            <a:r>
+              <a:rPr lang="en-US" dirty="0" smtClean="0">
+                <a:hlinkClick r:id="rId8"/>
+              </a:rPr>
+              <a:t>http</a:t>
+            </a:r>
+            <a:r>
+              <a:rPr lang="en-US" dirty="0">
+                <a:hlinkClick r:id="rId8"/>
+              </a:rPr>
+              <a:t>://gatling.io</a:t>
+            </a:r>
+            <a:r>
+              <a:rPr lang="en-US" dirty="0" smtClean="0">
+                <a:hlinkClick r:id="rId8"/>
+              </a:rPr>
+              <a:t>/</a:t>
+            </a:r>
+            <a:endParaRPr lang="en-US" dirty="0" smtClean="0"/>
+          </a:p>
+          <a:p>
+            <a:r>
+              <a:rPr lang="en-US" dirty="0">
+                <a:hlinkClick r:id="rId9"/>
+              </a:rPr>
+              <a:t>http://research.google.com/pubs/pub36356.</a:t>
+            </a:r>
+            <a:r>
+              <a:rPr lang="en-US" dirty="0" smtClean="0">
+                <a:hlinkClick r:id="rId9"/>
+              </a:rPr>
+              <a:t>html</a:t>
+            </a:r>
+            <a:endParaRPr lang="en-US" dirty="0" smtClean="0"/>
+          </a:p>
+          <a:p>
+            <a:r>
+              <a:rPr lang="en-US" dirty="0">
+                <a:hlinkClick r:id="rId10"/>
+              </a:rPr>
+              <a:t>http://twitter.github.io/zipkin</a:t>
+            </a:r>
+            <a:r>
+              <a:rPr lang="en-US" dirty="0" smtClean="0">
+                <a:hlinkClick r:id="rId10"/>
+              </a:rPr>
+              <a:t>/</a:t>
+            </a:r>
+            <a:endParaRPr lang="en-US" dirty="0" smtClean="0"/>
+          </a:p>
+          <a:p>
+            <a:r>
+              <a:rPr lang="en-US" dirty="0">
+                <a:hlinkClick r:id="rId11"/>
+              </a:rPr>
+              <a:t>http://oclc.org/careers.en.html</a:t>
+            </a:r>
+            <a:endParaRPr lang="en-US" dirty="0"/>
+          </a:p>
+          <a:p>
+            <a:endParaRPr lang="en-US" dirty="0" smtClean="0"/>
+          </a:p>
           <a:p>
             <a:pPr marL="0" indent="0">
               <a:buNone/>
             </a:pPr>
-            <a:r>
-              <a:rPr lang="en-US" dirty="0" smtClean="0">
-                <a:hlinkClick r:id="rId3"/>
-              </a:rPr>
-              <a:t>bakerj@oclc.org</a:t>
-            </a:r>
-            <a:endParaRPr lang="en-US" dirty="0" smtClean="0"/>
-          </a:p>
-          <a:p>
-            <a:pPr marL="0" indent="0">
-              <a:buNone/>
-            </a:pPr>
-            <a:r>
-              <a:rPr lang="en-US" dirty="0" smtClean="0">
-                <a:hlinkClick r:id="rId4"/>
-              </a:rPr>
-              <a:t>https</a:t>
-            </a:r>
-            <a:r>
-              <a:rPr lang="en-US" dirty="0">
-                <a:hlinkClick r:id="rId4"/>
-              </a:rPr>
-              <a:t>://github.com/</a:t>
-            </a:r>
-            <a:r>
-              <a:rPr lang="en-US" dirty="0" smtClean="0">
-                <a:hlinkClick r:id="rId4"/>
-              </a:rPr>
-              <a:t>solidjb</a:t>
-            </a:r>
-            <a:endParaRPr lang="en-US" dirty="0" smtClean="0"/>
-          </a:p>
-          <a:p>
-            <a:pPr marL="0" indent="0">
-              <a:buNone/>
-            </a:pPr>
-            <a:r>
-              <a:rPr lang="en-US" dirty="0">
-                <a:hlinkClick r:id="rId5"/>
-              </a:rPr>
-              <a:t>http://www.linkedin.com/pub/jonathan-baker/5/414/</a:t>
-            </a:r>
-            <a:r>
-              <a:rPr lang="en-US" dirty="0" smtClean="0">
-                <a:hlinkClick r:id="rId5"/>
-              </a:rPr>
-              <a:t>7b2</a:t>
-            </a:r>
-            <a:endParaRPr lang="en-US" dirty="0" smtClean="0"/>
-          </a:p>
-          <a:p>
             <a:endParaRPr lang="en-US" dirty="0"/>
           </a:p>
-        </p:txBody>
-      </p:sp>
-      <p:pic>
-        <p:nvPicPr>
-          <p:cNvPr id="4" name="Picture 3" descr="nationwide-logo*304.jpg"/>
-          <p:cNvPicPr>
-            <a:picLocks noChangeAspect="1"/>
-          </p:cNvPicPr>
-          <p:nvPr/>
-        </p:nvPicPr>
-        <p:blipFill>
-          <a:blip r:embed="rId6">
-            <a:extLst>
-              <a:ext uri="{28A0092B-C50C-407E-A947-70E740481C1C}">
-                <a14:useLocalDpi xmlns:a14="http://schemas.microsoft.com/office/drawing/2010/main" val="0"/>
-              </a:ext>
-            </a:extLst>
-          </a:blip>
-          <a:stretch>
-            <a:fillRect/>
-          </a:stretch>
-        </p:blipFill>
-        <p:spPr>
-          <a:xfrm>
-            <a:off x="6657295" y="2046793"/>
-            <a:ext cx="1551633" cy="1740483"/>
-          </a:xfrm>
-          <a:prstGeom prst="rect">
-            <a:avLst/>
-          </a:prstGeom>
-        </p:spPr>
-      </p:pic>
-      <p:pic>
-        <p:nvPicPr>
-          <p:cNvPr id="5" name="Picture 4" descr="td-amazon-smile-logo-01-large.jpg"/>
-          <p:cNvPicPr>
-            <a:picLocks noChangeAspect="1"/>
-          </p:cNvPicPr>
-          <p:nvPr/>
-        </p:nvPicPr>
-        <p:blipFill>
-          <a:blip r:embed="rId7">
-            <a:extLst>
-              <a:ext uri="{28A0092B-C50C-407E-A947-70E740481C1C}">
-                <a14:useLocalDpi xmlns:a14="http://schemas.microsoft.com/office/drawing/2010/main" val="0"/>
-              </a:ext>
-            </a:extLst>
-          </a:blip>
-          <a:stretch>
-            <a:fillRect/>
-          </a:stretch>
-        </p:blipFill>
-        <p:spPr>
-          <a:xfrm>
-            <a:off x="3488213" y="2046793"/>
-            <a:ext cx="2209267" cy="1795030"/>
-          </a:xfrm>
-          <a:prstGeom prst="rect">
-            <a:avLst/>
-          </a:prstGeom>
-        </p:spPr>
-      </p:pic>
-      <p:pic>
-        <p:nvPicPr>
-          <p:cNvPr id="6" name="Picture 5" descr="OCLC_Logo_V_Color_NoTag.png"/>
-          <p:cNvPicPr>
-            <a:picLocks noChangeAspect="1"/>
-          </p:cNvPicPr>
-          <p:nvPr/>
-        </p:nvPicPr>
-        <p:blipFill>
-          <a:blip r:embed="rId8">
-            <a:extLst>
-              <a:ext uri="{28A0092B-C50C-407E-A947-70E740481C1C}">
-                <a14:useLocalDpi xmlns:a14="http://schemas.microsoft.com/office/drawing/2010/main" val="0"/>
-              </a:ext>
-            </a:extLst>
-          </a:blip>
-          <a:stretch>
-            <a:fillRect/>
-          </a:stretch>
-        </p:blipFill>
-        <p:spPr>
-          <a:xfrm>
-            <a:off x="798841" y="2096029"/>
-            <a:ext cx="1924052" cy="1745794"/>
-          </a:xfrm>
-          <a:prstGeom prst="rect">
-            <a:avLst/>
-          </a:prstGeom>
-        </p:spPr>
-      </p:pic>
+          <a:p>
+            <a:endParaRPr lang="en-US" dirty="0"/>
+          </a:p>
+        </p:txBody>
+      </p:sp>
     </p:spTree>
     <p:extLst>
       <p:ext uri="{BB962C8B-B14F-4D97-AF65-F5344CB8AC3E}">
-        <p14:creationId xmlns:p14="http://schemas.microsoft.com/office/powerpoint/2010/main" val="1830400236"/>
+        <p14:creationId xmlns:p14="http://schemas.microsoft.com/office/powerpoint/2010/main" val="3193187975"/>
       </p:ext>
     </p:extLst>
   </p:cSld>
@@ -13563,6 +13856,236 @@
 </file>
 
 <file path=ppt/slides/slide30.xml><?xml version="1.0" encoding="utf-8"?>
+<p:sld xmlns:a="http://schemas.openxmlformats.org/drawingml/2006/main" xmlns:r="http://schemas.openxmlformats.org/officeDocument/2006/relationships" xmlns:p="http://schemas.openxmlformats.org/presentationml/2006/main">
+  <p:cSld>
+    <p:spTree>
+      <p:nvGrpSpPr>
+        <p:cNvPr id="1" name=""/>
+        <p:cNvGrpSpPr/>
+        <p:nvPr/>
+      </p:nvGrpSpPr>
+      <p:grpSpPr>
+        <a:xfrm>
+          <a:off x="0" y="0"/>
+          <a:ext cx="0" cy="0"/>
+          <a:chOff x="0" y="0"/>
+          <a:chExt cx="0" cy="0"/>
+        </a:xfrm>
+      </p:grpSpPr>
+      <p:sp>
+        <p:nvSpPr>
+          <p:cNvPr id="2" name="Title 1"/>
+          <p:cNvSpPr>
+            <a:spLocks noGrp="1"/>
+          </p:cNvSpPr>
+          <p:nvPr>
+            <p:ph type="title"/>
+          </p:nvPr>
+        </p:nvSpPr>
+        <p:spPr/>
+        <p:txBody>
+          <a:bodyPr/>
+          <a:lstStyle/>
+          <a:p>
+            <a:r>
+              <a:rPr lang="en-US" dirty="0" smtClean="0"/>
+              <a:t>Jonathan Baker</a:t>
+            </a:r>
+            <a:endParaRPr lang="en-US" dirty="0"/>
+          </a:p>
+        </p:txBody>
+      </p:sp>
+      <p:sp>
+        <p:nvSpPr>
+          <p:cNvPr id="3" name="Content Placeholder 2"/>
+          <p:cNvSpPr>
+            <a:spLocks noGrp="1"/>
+          </p:cNvSpPr>
+          <p:nvPr>
+            <p:ph idx="1"/>
+          </p:nvPr>
+        </p:nvSpPr>
+        <p:spPr>
+          <a:xfrm>
+            <a:off x="457200" y="4691187"/>
+            <a:ext cx="8229600" cy="1434976"/>
+          </a:xfrm>
+        </p:spPr>
+        <p:txBody>
+          <a:bodyPr>
+            <a:normAutofit fontScale="92500"/>
+          </a:bodyPr>
+          <a:lstStyle/>
+          <a:p>
+            <a:pPr marL="0" indent="0">
+              <a:buNone/>
+            </a:pPr>
+            <a:r>
+              <a:rPr lang="en-US" dirty="0" smtClean="0">
+                <a:hlinkClick r:id="rId3"/>
+              </a:rPr>
+              <a:t>bakerj@oclc.org</a:t>
+            </a:r>
+            <a:endParaRPr lang="en-US" dirty="0" smtClean="0"/>
+          </a:p>
+          <a:p>
+            <a:pPr marL="0" indent="0">
+              <a:buNone/>
+            </a:pPr>
+            <a:r>
+              <a:rPr lang="en-US" dirty="0" smtClean="0">
+                <a:hlinkClick r:id="rId4"/>
+              </a:rPr>
+              <a:t>https</a:t>
+            </a:r>
+            <a:r>
+              <a:rPr lang="en-US" dirty="0">
+                <a:hlinkClick r:id="rId4"/>
+              </a:rPr>
+              <a:t>://github.com/</a:t>
+            </a:r>
+            <a:r>
+              <a:rPr lang="en-US" dirty="0" smtClean="0">
+                <a:hlinkClick r:id="rId4"/>
+              </a:rPr>
+              <a:t>solidjb</a:t>
+            </a:r>
+            <a:endParaRPr lang="en-US" dirty="0" smtClean="0"/>
+          </a:p>
+          <a:p>
+            <a:pPr marL="0" indent="0">
+              <a:buNone/>
+            </a:pPr>
+            <a:r>
+              <a:rPr lang="en-US" dirty="0">
+                <a:hlinkClick r:id="rId5"/>
+              </a:rPr>
+              <a:t>http://www.linkedin.com/pub/jonathan-baker/5/414/</a:t>
+            </a:r>
+            <a:r>
+              <a:rPr lang="en-US" dirty="0" smtClean="0">
+                <a:hlinkClick r:id="rId5"/>
+              </a:rPr>
+              <a:t>7b2</a:t>
+            </a:r>
+            <a:endParaRPr lang="en-US" dirty="0" smtClean="0"/>
+          </a:p>
+          <a:p>
+            <a:endParaRPr lang="en-US" dirty="0"/>
+          </a:p>
+        </p:txBody>
+      </p:sp>
+      <p:pic>
+        <p:nvPicPr>
+          <p:cNvPr id="4" name="Picture 3" descr="nationwide-logo*304.jpg"/>
+          <p:cNvPicPr>
+            <a:picLocks noChangeAspect="1"/>
+          </p:cNvPicPr>
+          <p:nvPr/>
+        </p:nvPicPr>
+        <p:blipFill>
+          <a:blip r:embed="rId6">
+            <a:extLst>
+              <a:ext uri="{28A0092B-C50C-407E-A947-70E740481C1C}">
+                <a14:useLocalDpi xmlns:a14="http://schemas.microsoft.com/office/drawing/2010/main" val="0"/>
+              </a:ext>
+            </a:extLst>
+          </a:blip>
+          <a:stretch>
+            <a:fillRect/>
+          </a:stretch>
+        </p:blipFill>
+        <p:spPr>
+          <a:xfrm>
+            <a:off x="6657295" y="2046793"/>
+            <a:ext cx="1551633" cy="1740483"/>
+          </a:xfrm>
+          <a:prstGeom prst="rect">
+            <a:avLst/>
+          </a:prstGeom>
+        </p:spPr>
+      </p:pic>
+      <p:pic>
+        <p:nvPicPr>
+          <p:cNvPr id="5" name="Picture 4" descr="td-amazon-smile-logo-01-large.jpg"/>
+          <p:cNvPicPr>
+            <a:picLocks noChangeAspect="1"/>
+          </p:cNvPicPr>
+          <p:nvPr/>
+        </p:nvPicPr>
+        <p:blipFill>
+          <a:blip r:embed="rId7">
+            <a:extLst>
+              <a:ext uri="{28A0092B-C50C-407E-A947-70E740481C1C}">
+                <a14:useLocalDpi xmlns:a14="http://schemas.microsoft.com/office/drawing/2010/main" val="0"/>
+              </a:ext>
+            </a:extLst>
+          </a:blip>
+          <a:stretch>
+            <a:fillRect/>
+          </a:stretch>
+        </p:blipFill>
+        <p:spPr>
+          <a:xfrm>
+            <a:off x="3488213" y="2046793"/>
+            <a:ext cx="2209267" cy="1795030"/>
+          </a:xfrm>
+          <a:prstGeom prst="rect">
+            <a:avLst/>
+          </a:prstGeom>
+        </p:spPr>
+      </p:pic>
+      <p:pic>
+        <p:nvPicPr>
+          <p:cNvPr id="6" name="Picture 5" descr="OCLC_Logo_V_Color_NoTag.png"/>
+          <p:cNvPicPr>
+            <a:picLocks noChangeAspect="1"/>
+          </p:cNvPicPr>
+          <p:nvPr/>
+        </p:nvPicPr>
+        <p:blipFill>
+          <a:blip r:embed="rId8">
+            <a:extLst>
+              <a:ext uri="{28A0092B-C50C-407E-A947-70E740481C1C}">
+                <a14:useLocalDpi xmlns:a14="http://schemas.microsoft.com/office/drawing/2010/main" val="0"/>
+              </a:ext>
+            </a:extLst>
+          </a:blip>
+          <a:stretch>
+            <a:fillRect/>
+          </a:stretch>
+        </p:blipFill>
+        <p:spPr>
+          <a:xfrm>
+            <a:off x="798841" y="2096029"/>
+            <a:ext cx="1924052" cy="1745794"/>
+          </a:xfrm>
+          <a:prstGeom prst="rect">
+            <a:avLst/>
+          </a:prstGeom>
+        </p:spPr>
+      </p:pic>
+    </p:spTree>
+    <p:extLst>
+      <p:ext uri="{BB962C8B-B14F-4D97-AF65-F5344CB8AC3E}">
+        <p14:creationId xmlns:p14="http://schemas.microsoft.com/office/powerpoint/2010/main" val="1830400236"/>
+      </p:ext>
+    </p:extLst>
+  </p:cSld>
+  <p:clrMapOvr>
+    <a:masterClrMapping/>
+  </p:clrMapOvr>
+  <p:timing>
+    <p:tnLst>
+      <p:par>
+        <p:cTn xmlns:p14="http://schemas.microsoft.com/office/powerpoint/2010/main" id="1" dur="indefinite" restart="never" nodeType="tmRoot"/>
+      </p:par>
+    </p:tnLst>
+  </p:timing>
+</p:sld>
+</file>
+
+<file path=ppt/slides/slide31.xml><?xml version="1.0" encoding="utf-8"?>
 <p:sld xmlns:a="http://schemas.openxmlformats.org/drawingml/2006/main" xmlns:r="http://schemas.openxmlformats.org/officeDocument/2006/relationships" xmlns:p="http://schemas.openxmlformats.org/presentationml/2006/main">
   <p:cSld>
     <p:spTree>
@@ -15450,7 +15973,7 @@
       </p:sp>
       <p:pic>
         <p:nvPicPr>
-          <p:cNvPr id="4" name="Picture 3" descr="pointer.png"/>
+          <p:cNvPr id="6" name="Picture 5" descr="Files.png"/>
           <p:cNvPicPr>
             <a:picLocks noChangeAspect="1"/>
           </p:cNvPicPr>
@@ -15470,8 +15993,98 @@
         </p:blipFill>
         <p:spPr>
           <a:xfrm>
-            <a:off x="5139338" y="2410092"/>
-            <a:ext cx="1586962" cy="2144543"/>
+            <a:off x="275785" y="2410092"/>
+            <a:ext cx="1803400" cy="2336800"/>
+          </a:xfrm>
+          <a:prstGeom prst="rect">
+            <a:avLst/>
+          </a:prstGeom>
+        </p:spPr>
+      </p:pic>
+      <p:pic>
+        <p:nvPicPr>
+          <p:cNvPr id="20" name="Picture 19" descr="Files.png"/>
+          <p:cNvPicPr>
+            <a:picLocks noChangeAspect="1"/>
+          </p:cNvPicPr>
+          <p:nvPr/>
+        </p:nvPicPr>
+        <p:blipFill>
+          <a:blip r:embed="rId4">
+            <a:extLst>
+              <a:ext uri="{28A0092B-C50C-407E-A947-70E740481C1C}">
+                <a14:useLocalDpi xmlns:a14="http://schemas.microsoft.com/office/drawing/2010/main" val="0"/>
+              </a:ext>
+            </a:extLst>
+          </a:blip>
+          <a:stretch>
+            <a:fillRect/>
+          </a:stretch>
+        </p:blipFill>
+        <p:spPr>
+          <a:xfrm>
+            <a:off x="4922900" y="2410092"/>
+            <a:ext cx="1803400" cy="2336800"/>
+          </a:xfrm>
+          <a:prstGeom prst="rect">
+            <a:avLst/>
+          </a:prstGeom>
+        </p:spPr>
+      </p:pic>
+      <p:pic>
+        <p:nvPicPr>
+          <p:cNvPr id="21" name="Picture 20" descr="Files.png"/>
+          <p:cNvPicPr>
+            <a:picLocks noChangeAspect="1"/>
+          </p:cNvPicPr>
+          <p:nvPr/>
+        </p:nvPicPr>
+        <p:blipFill>
+          <a:blip r:embed="rId4">
+            <a:extLst>
+              <a:ext uri="{28A0092B-C50C-407E-A947-70E740481C1C}">
+                <a14:useLocalDpi xmlns:a14="http://schemas.microsoft.com/office/drawing/2010/main" val="0"/>
+              </a:ext>
+            </a:extLst>
+          </a:blip>
+          <a:stretch>
+            <a:fillRect/>
+          </a:stretch>
+        </p:blipFill>
+        <p:spPr>
+          <a:xfrm>
+            <a:off x="2615041" y="2410092"/>
+            <a:ext cx="1803400" cy="2336800"/>
+          </a:xfrm>
+          <a:prstGeom prst="rect">
+            <a:avLst/>
+          </a:prstGeom>
+        </p:spPr>
+      </p:pic>
+      <p:pic>
+        <p:nvPicPr>
+          <p:cNvPr id="22" name="Picture 21" descr="Files.png"/>
+          <p:cNvPicPr>
+            <a:picLocks noChangeAspect="1"/>
+          </p:cNvPicPr>
+          <p:nvPr/>
+        </p:nvPicPr>
+        <p:blipFill>
+          <a:blip r:embed="rId4">
+            <a:extLst>
+              <a:ext uri="{28A0092B-C50C-407E-A947-70E740481C1C}">
+                <a14:useLocalDpi xmlns:a14="http://schemas.microsoft.com/office/drawing/2010/main" val="0"/>
+              </a:ext>
+            </a:extLst>
+          </a:blip>
+          <a:stretch>
+            <a:fillRect/>
+          </a:stretch>
+        </p:blipFill>
+        <p:spPr>
+          <a:xfrm>
+            <a:off x="7214865" y="2410092"/>
+            <a:ext cx="1803400" cy="2336800"/>
           </a:xfrm>
           <a:prstGeom prst="rect">
             <a:avLst/>
@@ -15510,7 +16123,7 @@
       </p:pic>
       <p:pic>
         <p:nvPicPr>
-          <p:cNvPr id="6" name="Picture 5" descr="Files.png"/>
+          <p:cNvPr id="4" name="Picture 3" descr="pointer.png"/>
           <p:cNvPicPr>
             <a:picLocks noChangeAspect="1"/>
           </p:cNvPicPr>
@@ -15530,98 +16143,8 @@
         </p:blipFill>
         <p:spPr>
           <a:xfrm>
-            <a:off x="275785" y="2410092"/>
-            <a:ext cx="1803400" cy="2336800"/>
-          </a:xfrm>
-          <a:prstGeom prst="rect">
-            <a:avLst/>
-          </a:prstGeom>
-        </p:spPr>
-      </p:pic>
-      <p:pic>
-        <p:nvPicPr>
-          <p:cNvPr id="20" name="Picture 19" descr="Files.png"/>
-          <p:cNvPicPr>
-            <a:picLocks noChangeAspect="1"/>
-          </p:cNvPicPr>
-          <p:nvPr/>
-        </p:nvPicPr>
-        <p:blipFill>
-          <a:blip r:embed="rId6">
-            <a:extLst>
-              <a:ext uri="{28A0092B-C50C-407E-A947-70E740481C1C}">
-                <a14:useLocalDpi xmlns:a14="http://schemas.microsoft.com/office/drawing/2010/main" val="0"/>
-              </a:ext>
-            </a:extLst>
-          </a:blip>
-          <a:stretch>
-            <a:fillRect/>
-          </a:stretch>
-        </p:blipFill>
-        <p:spPr>
-          <a:xfrm>
-            <a:off x="4922900" y="2410092"/>
-            <a:ext cx="1803400" cy="2336800"/>
-          </a:xfrm>
-          <a:prstGeom prst="rect">
-            <a:avLst/>
-          </a:prstGeom>
-        </p:spPr>
-      </p:pic>
-      <p:pic>
-        <p:nvPicPr>
-          <p:cNvPr id="21" name="Picture 20" descr="Files.png"/>
-          <p:cNvPicPr>
-            <a:picLocks noChangeAspect="1"/>
-          </p:cNvPicPr>
-          <p:nvPr/>
-        </p:nvPicPr>
-        <p:blipFill>
-          <a:blip r:embed="rId6">
-            <a:extLst>
-              <a:ext uri="{28A0092B-C50C-407E-A947-70E740481C1C}">
-                <a14:useLocalDpi xmlns:a14="http://schemas.microsoft.com/office/drawing/2010/main" val="0"/>
-              </a:ext>
-            </a:extLst>
-          </a:blip>
-          <a:stretch>
-            <a:fillRect/>
-          </a:stretch>
-        </p:blipFill>
-        <p:spPr>
-          <a:xfrm>
-            <a:off x="2615041" y="2410092"/>
-            <a:ext cx="1803400" cy="2336800"/>
-          </a:xfrm>
-          <a:prstGeom prst="rect">
-            <a:avLst/>
-          </a:prstGeom>
-        </p:spPr>
-      </p:pic>
-      <p:pic>
-        <p:nvPicPr>
-          <p:cNvPr id="22" name="Picture 21" descr="Files.png"/>
-          <p:cNvPicPr>
-            <a:picLocks noChangeAspect="1"/>
-          </p:cNvPicPr>
-          <p:nvPr/>
-        </p:nvPicPr>
-        <p:blipFill>
-          <a:blip r:embed="rId6">
-            <a:extLst>
-              <a:ext uri="{28A0092B-C50C-407E-A947-70E740481C1C}">
-                <a14:useLocalDpi xmlns:a14="http://schemas.microsoft.com/office/drawing/2010/main" val="0"/>
-              </a:ext>
-            </a:extLst>
-          </a:blip>
-          <a:stretch>
-            <a:fillRect/>
-          </a:stretch>
-        </p:blipFill>
-        <p:spPr>
-          <a:xfrm>
-            <a:off x="7214865" y="2410092"/>
-            <a:ext cx="1803400" cy="2336800"/>
+            <a:off x="5139338" y="2410092"/>
+            <a:ext cx="1586962" cy="2144543"/>
           </a:xfrm>
           <a:prstGeom prst="rect">
             <a:avLst/>
@@ -15659,7 +16182,7 @@
                             </p:stCondLst>
                             <p:childTnLst>
                               <p:par>
-                                <p:cTn id="5" presetID="1" presetClass="exit" presetSubtype="0" fill="hold" nodeType="clickEffect">
+                                <p:cTn id="5" presetID="1" presetClass="entr" presetSubtype="0" fill="hold" nodeType="clickEffect">
                                   <p:stCondLst>
                                     <p:cond delay="0"/>
                                   </p:stCondLst>
@@ -15679,14 +16202,14 @@
                                         </p:attrNameLst>
                                       </p:cBhvr>
                                       <p:to>
-                                        <p:strVal val="hidden"/>
+                                        <p:strVal val="visible"/>
                                       </p:to>
                                     </p:set>
                                   </p:childTnLst>
                                 </p:cTn>
                               </p:par>
                               <p:par>
-                                <p:cTn id="7" presetID="1" presetClass="exit" presetSubtype="0" fill="hold" nodeType="withEffect">
+                                <p:cTn id="7" presetID="1" presetClass="entr" presetSubtype="0" fill="hold" nodeType="withEffect">
                                   <p:stCondLst>
                                     <p:cond delay="0"/>
                                   </p:stCondLst>
@@ -15706,6 +16229,51 @@
                                         </p:attrNameLst>
                                       </p:cBhvr>
                                       <p:to>
+                                        <p:strVal val="visible"/>
+                                      </p:to>
+                                    </p:set>
+                                  </p:childTnLst>
+                                </p:cTn>
+                              </p:par>
+                            </p:childTnLst>
+                          </p:cTn>
+                        </p:par>
+                      </p:childTnLst>
+                    </p:cTn>
+                  </p:par>
+                  <p:par>
+                    <p:cTn id="9" fill="hold">
+                      <p:stCondLst>
+                        <p:cond delay="indefinite"/>
+                      </p:stCondLst>
+                      <p:childTnLst>
+                        <p:par>
+                          <p:cTn id="10" fill="hold">
+                            <p:stCondLst>
+                              <p:cond delay="0"/>
+                            </p:stCondLst>
+                            <p:childTnLst>
+                              <p:par>
+                                <p:cTn id="11" presetID="1" presetClass="exit" presetSubtype="0" fill="hold" nodeType="clickEffect">
+                                  <p:stCondLst>
+                                    <p:cond delay="0"/>
+                                  </p:stCondLst>
+                                  <p:childTnLst>
+                                    <p:set>
+                                      <p:cBhvr>
+                                        <p:cTn id="12" dur="1" fill="hold">
+                                          <p:stCondLst>
+                                            <p:cond delay="0"/>
+                                          </p:stCondLst>
+                                        </p:cTn>
+                                        <p:tgtEl>
+                                          <p:spTgt spid="5"/>
+                                        </p:tgtEl>
+                                        <p:attrNameLst>
+                                          <p:attrName>style.visibility</p:attrName>
+                                        </p:attrNameLst>
+                                      </p:cBhvr>
+                                      <p:to>
                                         <p:strVal val="hidden"/>
                                       </p:to>
                                     </p:set>
@@ -15713,14 +16281,41 @@
                                 </p:cTn>
                               </p:par>
                               <p:par>
-                                <p:cTn id="9" presetID="1" presetClass="entr" presetSubtype="0" fill="hold" nodeType="withEffect">
+                                <p:cTn id="13" presetID="1" presetClass="exit" presetSubtype="0" fill="hold" nodeType="withEffect">
                                   <p:stCondLst>
                                     <p:cond delay="0"/>
                                   </p:stCondLst>
                                   <p:childTnLst>
                                     <p:set>
                                       <p:cBhvr>
-                                        <p:cTn id="10" dur="1" fill="hold">
+                                        <p:cTn id="14" dur="1" fill="hold">
+                                          <p:stCondLst>
+                                            <p:cond delay="0"/>
+                                          </p:stCondLst>
+                                        </p:cTn>
+                                        <p:tgtEl>
+                                          <p:spTgt spid="4"/>
+                                        </p:tgtEl>
+                                        <p:attrNameLst>
+                                          <p:attrName>style.visibility</p:attrName>
+                                        </p:attrNameLst>
+                                      </p:cBhvr>
+                                      <p:to>
+                                        <p:strVal val="hidden"/>
+                                      </p:to>
+                                    </p:set>
+                                  </p:childTnLst>
+                                </p:cTn>
+                              </p:par>
+                              <p:par>
+                                <p:cTn id="15" presetID="1" presetClass="entr" presetSubtype="0" fill="hold" nodeType="withEffect">
+                                  <p:stCondLst>
+                                    <p:cond delay="0"/>
+                                  </p:stCondLst>
+                                  <p:childTnLst>
+                                    <p:set>
+                                      <p:cBhvr>
+                                        <p:cTn id="16" dur="1" fill="hold">
                                           <p:stCondLst>
                                             <p:cond delay="0"/>
                                           </p:stCondLst>
@@ -15740,14 +16335,14 @@
                                 </p:cTn>
                               </p:par>
                               <p:par>
-                                <p:cTn id="11" presetID="1" presetClass="entr" presetSubtype="0" fill="hold" nodeType="withEffect">
+                                <p:cTn id="17" presetID="1" presetClass="entr" presetSubtype="0" fill="hold" nodeType="withEffect">
                                   <p:stCondLst>
                                     <p:cond delay="0"/>
                                   </p:stCondLst>
                                   <p:childTnLst>
                                     <p:set>
                                       <p:cBhvr>
-                                        <p:cTn id="12" dur="1" fill="hold">
+                                        <p:cTn id="18" dur="1" fill="hold">
                                           <p:stCondLst>
                                             <p:cond delay="0"/>
                                           </p:stCondLst>
@@ -15767,14 +16362,14 @@
                                 </p:cTn>
                               </p:par>
                               <p:par>
-                                <p:cTn id="13" presetID="1" presetClass="entr" presetSubtype="0" fill="hold" nodeType="withEffect">
+                                <p:cTn id="19" presetID="1" presetClass="entr" presetSubtype="0" fill="hold" nodeType="withEffect">
                                   <p:stCondLst>
                                     <p:cond delay="0"/>
                                   </p:stCondLst>
                                   <p:childTnLst>
                                     <p:set>
                                       <p:cBhvr>
-                                        <p:cTn id="14" dur="1" fill="hold">
+                                        <p:cTn id="20" dur="1" fill="hold">
                                           <p:stCondLst>
                                             <p:cond delay="0"/>
                                           </p:stCondLst>
@@ -15794,14 +16389,14 @@
                                 </p:cTn>
                               </p:par>
                               <p:par>
-                                <p:cTn id="15" presetID="1" presetClass="entr" presetSubtype="0" fill="hold" nodeType="withEffect">
+                                <p:cTn id="21" presetID="1" presetClass="entr" presetSubtype="0" fill="hold" nodeType="withEffect">
                                   <p:stCondLst>
                                     <p:cond delay="0"/>
                                   </p:stCondLst>
                                   <p:childTnLst>
                                     <p:set>
                                       <p:cBhvr>
-                                        <p:cTn id="16" dur="1" fill="hold">
+                                        <p:cTn id="22" dur="1" fill="hold">
                                           <p:stCondLst>
                                             <p:cond delay="0"/>
                                           </p:stCondLst>

</xml_diff>

<commit_message>
Added the word id to the amount of work slide.
</commit_message>
<xml_diff>
--- a/oclc-elk.pptx
+++ b/oclc-elk.pptx
@@ -13202,7 +13202,23 @@
                   <a:srgbClr val="000000"/>
                 </a:solidFill>
               </a:rPr>
-              <a:t>Event propagation = ~300 lines of code</a:t>
+              <a:t>Event </a:t>
+            </a:r>
+            <a:r>
+              <a:rPr lang="en-US" dirty="0" smtClean="0">
+                <a:solidFill>
+                  <a:srgbClr val="000000"/>
+                </a:solidFill>
+              </a:rPr>
+              <a:t>Id propagation </a:t>
+            </a:r>
+            <a:r>
+              <a:rPr lang="en-US" dirty="0" smtClean="0">
+                <a:solidFill>
+                  <a:srgbClr val="000000"/>
+                </a:solidFill>
+              </a:rPr>
+              <a:t>= ~300 lines of code</a:t>
             </a:r>
           </a:p>
           <a:p>
@@ -13222,7 +13238,23 @@
                   <a:srgbClr val="000000"/>
                 </a:solidFill>
               </a:rPr>
-              <a:t>Client propagation = ~40 lines of code</a:t>
+              <a:t>Client </a:t>
+            </a:r>
+            <a:r>
+              <a:rPr lang="en-US" dirty="0" smtClean="0">
+                <a:solidFill>
+                  <a:srgbClr val="000000"/>
+                </a:solidFill>
+              </a:rPr>
+              <a:t>Id propagation </a:t>
+            </a:r>
+            <a:r>
+              <a:rPr lang="en-US" dirty="0" smtClean="0">
+                <a:solidFill>
+                  <a:srgbClr val="000000"/>
+                </a:solidFill>
+              </a:rPr>
+              <a:t>= ~40 lines of code</a:t>
             </a:r>
           </a:p>
           <a:p>

</xml_diff>

<commit_message>
minor reformatting of some slide notes (not new content)
</commit_message>
<xml_diff>
--- a/oclc-elk.pptx
+++ b/oclc-elk.pptx
@@ -222,7 +222,7 @@
           <a:p>
             <a:fld id="{26AD1A27-936B-714C-A770-4CD7AA64F397}" type="datetimeFigureOut">
               <a:rPr lang="en-US" smtClean="0"/>
-              <a:t>1/1/15</a:t>
+              <a:t>1/7/15</a:t>
             </a:fld>
             <a:endParaRPr lang="en-US"/>
           </a:p>
@@ -565,7 +565,6 @@
               <a:rPr lang="en-US" baseline="0" dirty="0" smtClean="0"/>
               <a:t>I’d like to tell you about where I work, and the issues we had, and then what we did to fix them.</a:t>
             </a:r>
-            <a:endParaRPr lang="en-US" baseline="0" dirty="0" smtClean="0"/>
           </a:p>
         </p:txBody>
       </p:sp>
@@ -1265,11 +1264,7 @@
             </a:r>
             <a:r>
               <a:rPr lang="en-US" sz="1200" dirty="0" smtClean="0"/>
-              <a:t> </a:t>
-            </a:r>
-            <a:r>
-              <a:rPr lang="en-US" sz="1200" dirty="0" smtClean="0"/>
-              <a:t>is a project similar to Apache Flume if you are </a:t>
+              <a:t> is a project similar to Apache Flume if you are </a:t>
             </a:r>
             <a:r>
               <a:rPr lang="en-US" sz="1200" dirty="0" err="1" smtClean="0"/>
@@ -1478,13 +1473,8 @@
             </a:pPr>
             <a:r>
               <a:rPr lang="en-US" sz="1200" baseline="0" dirty="0" smtClean="0"/>
-              <a:t>Or unstructured data can be treated the same as structured</a:t>
-            </a:r>
-            <a:r>
-              <a:rPr lang="en-US" sz="1200" baseline="0" dirty="0" smtClean="0"/>
-              <a:t>.</a:t>
-            </a:r>
-            <a:endParaRPr lang="en-US" sz="1200" baseline="0" dirty="0" smtClean="0"/>
+              <a:t>Or unstructured data can be treated the same as structured.</a:t>
+            </a:r>
           </a:p>
           <a:p>
             <a:pPr marL="0" marR="0" indent="0" algn="l" defTabSz="457200" rtl="0" eaLnBrk="1" fontAlgn="auto" latinLnBrk="0" hangingPunct="1">
@@ -1635,11 +1625,7 @@
             </a:r>
             <a:r>
               <a:rPr lang="en-US" sz="1200" baseline="0" dirty="0" smtClean="0"/>
-              <a:t> – entire java ecosystem available to you</a:t>
-            </a:r>
-            <a:r>
-              <a:rPr lang="en-US" sz="1200" baseline="0" dirty="0" smtClean="0"/>
-              <a:t>.  Most of ruby ecosystem is available to you.</a:t>
+              <a:t> – entire java ecosystem available to you.  Most of ruby ecosystem is available to you.</a:t>
             </a:r>
             <a:endParaRPr lang="en-US" sz="1200" dirty="0" smtClean="0"/>
           </a:p>
@@ -1734,11 +1720,7 @@
             </a:r>
             <a:r>
               <a:rPr lang="en-US" sz="1200" dirty="0" smtClean="0"/>
-              <a:t> allows you to visualize logs and time-stamped </a:t>
-            </a:r>
-            <a:r>
-              <a:rPr lang="en-US" sz="1200" dirty="0" smtClean="0"/>
-              <a:t>data</a:t>
+              <a:t> allows you to visualize logs and time-stamped data</a:t>
             </a:r>
           </a:p>
           <a:p>
@@ -3518,7 +3500,35 @@
             </a:r>
             <a:r>
               <a:rPr lang="en-US" baseline="0" dirty="0" smtClean="0"/>
-              <a:t>  These are not the problems I am here to discuss.  I want to talk about the problems you experience when trying to figure out an issue with an application.</a:t>
+              <a:t>  </a:t>
+            </a:r>
+            <a:endParaRPr lang="en-US" baseline="0" dirty="0" smtClean="0"/>
+          </a:p>
+          <a:p>
+            <a:endParaRPr lang="en-US" baseline="0" dirty="0" smtClean="0"/>
+          </a:p>
+          <a:p>
+            <a:r>
+              <a:rPr lang="en-US" baseline="0" dirty="0" smtClean="0"/>
+              <a:t>These </a:t>
+            </a:r>
+            <a:r>
+              <a:rPr lang="en-US" baseline="0" dirty="0" smtClean="0"/>
+              <a:t>are not the problems I am here to discuss.  </a:t>
+            </a:r>
+            <a:endParaRPr lang="en-US" baseline="0" dirty="0" smtClean="0"/>
+          </a:p>
+          <a:p>
+            <a:endParaRPr lang="en-US" baseline="0" dirty="0" smtClean="0"/>
+          </a:p>
+          <a:p>
+            <a:r>
+              <a:rPr lang="en-US" baseline="0" dirty="0" smtClean="0"/>
+              <a:t>I </a:t>
+            </a:r>
+            <a:r>
+              <a:rPr lang="en-US" baseline="0" dirty="0" smtClean="0"/>
+              <a:t>want to talk about the problems you experience when trying to figure out an issue with an application.</a:t>
             </a:r>
             <a:endParaRPr lang="en-US" dirty="0"/>
           </a:p>
@@ -4298,7 +4308,7 @@
           <a:p>
             <a:fld id="{216C5678-EE20-4FA5-88E2-6E0BD67A2E26}" type="datetime1">
               <a:rPr lang="en-US" smtClean="0"/>
-              <a:t>1/1/15</a:t>
+              <a:t>1/7/15</a:t>
             </a:fld>
             <a:endParaRPr lang="en-US" dirty="0"/>
           </a:p>
@@ -4468,7 +4478,7 @@
           <a:p>
             <a:fld id="{EA051B39-B140-43FE-96DB-472A2B59CE7C}" type="datetime1">
               <a:rPr lang="en-US" smtClean="0"/>
-              <a:t>1/1/15</a:t>
+              <a:t>1/7/15</a:t>
             </a:fld>
             <a:endParaRPr lang="en-US"/>
           </a:p>
@@ -4648,7 +4658,7 @@
           <a:p>
             <a:fld id="{DA600BB2-27C5-458B-ABCE-839C88CF47CE}" type="datetime1">
               <a:rPr lang="en-US" smtClean="0"/>
-              <a:t>1/1/15</a:t>
+              <a:t>1/7/15</a:t>
             </a:fld>
             <a:endParaRPr lang="en-US"/>
           </a:p>
@@ -4836,7 +4846,7 @@
           <a:p>
             <a:fld id="{B11D738E-8962-435F-8C43-147B8DD7E819}" type="datetime1">
               <a:rPr lang="en-US" smtClean="0"/>
-              <a:t>1/1/15</a:t>
+              <a:t>1/7/15</a:t>
             </a:fld>
             <a:endParaRPr lang="en-US"/>
           </a:p>
@@ -5103,7 +5113,7 @@
           <a:p>
             <a:fld id="{09CAEA93-55E7-4DA9-90C2-089A26EEFEC4}" type="datetime1">
               <a:rPr lang="en-US" smtClean="0"/>
-              <a:t>1/1/15</a:t>
+              <a:t>1/7/15</a:t>
             </a:fld>
             <a:endParaRPr lang="en-US"/>
           </a:p>
@@ -5456,7 +5466,7 @@
           <a:p>
             <a:fld id="{E34CF3C7-6809-4F39-BD67-A75817BDDE0A}" type="datetime1">
               <a:rPr lang="en-US" smtClean="0"/>
-              <a:t>1/1/15</a:t>
+              <a:t>1/7/15</a:t>
             </a:fld>
             <a:endParaRPr lang="en-US"/>
           </a:p>
@@ -5769,7 +5779,7 @@
           <a:p>
             <a:fld id="{F7EAEB24-CE78-465C-A726-91D0868FA48F}" type="datetime1">
               <a:rPr lang="en-US" smtClean="0"/>
-              <a:t>1/1/15</a:t>
+              <a:t>1/7/15</a:t>
             </a:fld>
             <a:endParaRPr lang="en-US"/>
           </a:p>
@@ -6001,7 +6011,7 @@
           <a:p>
             <a:fld id="{40BAADF0-1749-4E8B-9691-B44A5F8C0895}" type="datetime1">
               <a:rPr lang="en-US" smtClean="0"/>
-              <a:t>1/1/15</a:t>
+              <a:t>1/7/15</a:t>
             </a:fld>
             <a:endParaRPr lang="en-US"/>
           </a:p>
@@ -6096,7 +6106,7 @@
           <a:p>
             <a:fld id="{A8AF628A-A867-4937-BBE5-207DB6F9C51A}" type="datetime1">
               <a:rPr lang="en-US" smtClean="0"/>
-              <a:t>1/1/15</a:t>
+              <a:t>1/7/15</a:t>
             </a:fld>
             <a:endParaRPr lang="en-US"/>
           </a:p>
@@ -6389,7 +6399,7 @@
           <a:p>
             <a:fld id="{118BBB94-68E6-4675-A946-F1C5994EDBD7}" type="datetime1">
               <a:rPr lang="en-US" smtClean="0"/>
-              <a:t>1/1/15</a:t>
+              <a:t>1/7/15</a:t>
             </a:fld>
             <a:endParaRPr lang="en-US"/>
           </a:p>
@@ -6663,7 +6673,7 @@
           <a:p>
             <a:fld id="{DC3B8377-21E3-4835-B75D-4E2847E2750F}" type="datetime1">
               <a:rPr lang="en-US" smtClean="0"/>
-              <a:t>1/1/15</a:t>
+              <a:t>1/7/15</a:t>
             </a:fld>
             <a:endParaRPr lang="en-US"/>
           </a:p>
@@ -6878,7 +6888,7 @@
           <a:p>
             <a:fld id="{B0C4986D-6BE9-4264-908F-02DB36FD8D6C}" type="datetime1">
               <a:rPr lang="en-US" smtClean="0"/>
-              <a:t>1/1/15</a:t>
+              <a:t>1/7/15</a:t>
             </a:fld>
             <a:endParaRPr lang="en-US" dirty="0"/>
           </a:p>
@@ -13202,23 +13212,7 @@
                   <a:srgbClr val="000000"/>
                 </a:solidFill>
               </a:rPr>
-              <a:t>Event </a:t>
-            </a:r>
-            <a:r>
-              <a:rPr lang="en-US" dirty="0" smtClean="0">
-                <a:solidFill>
-                  <a:srgbClr val="000000"/>
-                </a:solidFill>
-              </a:rPr>
-              <a:t>Id propagation </a:t>
-            </a:r>
-            <a:r>
-              <a:rPr lang="en-US" dirty="0" smtClean="0">
-                <a:solidFill>
-                  <a:srgbClr val="000000"/>
-                </a:solidFill>
-              </a:rPr>
-              <a:t>= ~300 lines of code</a:t>
+              <a:t>Event Id propagation = ~300 lines of code</a:t>
             </a:r>
           </a:p>
           <a:p>
@@ -13238,23 +13232,7 @@
                   <a:srgbClr val="000000"/>
                 </a:solidFill>
               </a:rPr>
-              <a:t>Client </a:t>
-            </a:r>
-            <a:r>
-              <a:rPr lang="en-US" dirty="0" smtClean="0">
-                <a:solidFill>
-                  <a:srgbClr val="000000"/>
-                </a:solidFill>
-              </a:rPr>
-              <a:t>Id propagation </a:t>
-            </a:r>
-            <a:r>
-              <a:rPr lang="en-US" dirty="0" smtClean="0">
-                <a:solidFill>
-                  <a:srgbClr val="000000"/>
-                </a:solidFill>
-              </a:rPr>
-              <a:t>= ~40 lines of code</a:t>
+              <a:t>Client Id propagation = ~40 lines of code</a:t>
             </a:r>
           </a:p>
           <a:p>
@@ -15627,11 +15605,7 @@
           <a:p>
             <a:r>
               <a:rPr lang="en-US" dirty="0" smtClean="0"/>
-              <a:t>Productio</a:t>
-            </a:r>
-            <a:r>
-              <a:rPr lang="en-US" dirty="0" smtClean="0"/>
-              <a:t>n Access</a:t>
+              <a:t>Production Access</a:t>
             </a:r>
             <a:endParaRPr lang="en-US" dirty="0"/>
           </a:p>

</xml_diff>

<commit_message>
Added aliases for the individual service searches in the weight and timing dashboard
</commit_message>
<xml_diff>
--- a/oclc-elk.pptx
+++ b/oclc-elk.pptx
@@ -2875,7 +2875,20 @@
           <a:p>
             <a:r>
               <a:rPr lang="en-US" baseline="0" dirty="0" smtClean="0"/>
-              <a:t>When starting demo describe </a:t>
+              <a:t>Explain that there are random wait times and random failures injected into each service.</a:t>
+            </a:r>
+          </a:p>
+          <a:p>
+            <a:endParaRPr lang="en-US" baseline="0" dirty="0" smtClean="0"/>
+          </a:p>
+          <a:p>
+            <a:r>
+              <a:rPr lang="en-US" baseline="0" dirty="0" smtClean="0"/>
+              <a:t>When </a:t>
+            </a:r>
+            <a:r>
+              <a:rPr lang="en-US" baseline="0" dirty="0" smtClean="0"/>
+              <a:t>starting demo describe </a:t>
             </a:r>
             <a:r>
               <a:rPr lang="en-US" baseline="0" dirty="0" err="1" smtClean="0"/>
@@ -13212,7 +13225,31 @@
                   <a:srgbClr val="000000"/>
                 </a:solidFill>
               </a:rPr>
-              <a:t>Event Id propagation = ~300 lines of code</a:t>
+              <a:t>Event Id propagation </a:t>
+            </a:r>
+            <a:r>
+              <a:rPr lang="en-US" smtClean="0">
+                <a:solidFill>
+                  <a:srgbClr val="000000"/>
+                </a:solidFill>
+              </a:rPr>
+              <a:t>= </a:t>
+            </a:r>
+            <a:r>
+              <a:rPr lang="en-US" smtClean="0">
+                <a:solidFill>
+                  <a:srgbClr val="000000"/>
+                </a:solidFill>
+              </a:rPr>
+              <a:t>~400 </a:t>
+            </a:r>
+            <a:r>
+              <a:rPr lang="en-US" dirty="0" smtClean="0">
+                <a:solidFill>
+                  <a:srgbClr val="000000"/>
+                </a:solidFill>
+              </a:rPr>
+              <a:t>lines of code</a:t>
             </a:r>
           </a:p>
           <a:p>

</xml_diff>